<commit_message>
Atualização do powerpoint de mds
Foi posto o Sprint relativo a DA e os respetivos burndown charts
</commit_message>
<xml_diff>
--- a/doc/Projeto de Metodologias de Desenvolvimento de software.pptx
+++ b/doc/Projeto de Metodologias de Desenvolvimento de software.pptx
@@ -21,6 +21,9 @@
     <p:sldId id="269" r:id="rId15"/>
     <p:sldId id="270" r:id="rId16"/>
     <p:sldId id="271" r:id="rId17"/>
+    <p:sldId id="272" r:id="rId18"/>
+    <p:sldId id="273" r:id="rId19"/>
+    <p:sldId id="274" r:id="rId20"/>
   </p:sldIdLst>
   <p:sldSz cx="12192000" cy="6858000"/>
   <p:notesSz cx="6858000" cy="9144000"/>
@@ -119,6 +122,11 @@
       </a:defRPr>
     </a:lvl9pPr>
   </p:defaultTextStyle>
+  <p:extLst>
+    <p:ext uri="{EFAFB233-063F-42B5-8137-9DF3F51BA10A}">
+      <p15:sldGuideLst xmlns:p15="http://schemas.microsoft.com/office/powerpoint/2012/main"/>
+    </p:ext>
+  </p:extLst>
 </p:presentation>
 </file>
 
@@ -1037,6 +1045,880 @@
 </c:chartSpace>
 </file>
 
+<file path=ppt/charts/chart3.xml><?xml version="1.0" encoding="utf-8"?>
+<c:chartSpace xmlns:c="http://schemas.openxmlformats.org/drawingml/2006/chart" xmlns:a="http://schemas.openxmlformats.org/drawingml/2006/main" xmlns:r="http://schemas.openxmlformats.org/officeDocument/2006/relationships" xmlns:c16r2="http://schemas.microsoft.com/office/drawing/2015/06/chart">
+  <c:date1904 val="0"/>
+  <c:lang val="pt-PT"/>
+  <c:roundedCorners val="0"/>
+  <mc:AlternateContent xmlns:mc="http://schemas.openxmlformats.org/markup-compatibility/2006">
+    <mc:Choice xmlns:c14="http://schemas.microsoft.com/office/drawing/2007/8/2/chart" Requires="c14">
+      <c14:style val="102"/>
+    </mc:Choice>
+    <mc:Fallback>
+      <c:style val="2"/>
+    </mc:Fallback>
+  </mc:AlternateContent>
+  <c:chart>
+    <c:title>
+      <c:tx>
+        <c:rich>
+          <a:bodyPr rot="0" spcFirstLastPara="1" vertOverflow="ellipsis" vert="horz" wrap="square" anchor="ctr" anchorCtr="1"/>
+          <a:lstStyle/>
+          <a:p>
+            <a:pPr>
+              <a:defRPr sz="1862" b="0" i="0" u="none" strike="noStrike" kern="1200" spc="0" baseline="0">
+                <a:solidFill>
+                  <a:schemeClr val="tx1">
+                    <a:lumMod val="65000"/>
+                    <a:lumOff val="35000"/>
+                  </a:schemeClr>
+                </a:solidFill>
+                <a:latin typeface="+mn-lt"/>
+                <a:ea typeface="+mn-ea"/>
+                <a:cs typeface="+mn-cs"/>
+              </a:defRPr>
+            </a:pPr>
+            <a:r>
+              <a:rPr lang="pt-PT" dirty="0" err="1"/>
+              <a:t>Burndown</a:t>
+            </a:r>
+            <a:r>
+              <a:rPr lang="pt-PT" dirty="0"/>
+              <a:t> </a:t>
+            </a:r>
+            <a:r>
+              <a:rPr lang="pt-PT" dirty="0" err="1"/>
+              <a:t>Chart</a:t>
+            </a:r>
+            <a:endParaRPr lang="pt-PT" dirty="0"/>
+          </a:p>
+        </c:rich>
+      </c:tx>
+      <c:layout>
+        <c:manualLayout>
+          <c:xMode val="edge"/>
+          <c:yMode val="edge"/>
+          <c:x val="0.30938948415584488"/>
+          <c:y val="3.4162039249582839E-2"/>
+        </c:manualLayout>
+      </c:layout>
+      <c:overlay val="0"/>
+      <c:spPr>
+        <a:solidFill>
+          <a:schemeClr val="bg2"/>
+        </a:solidFill>
+        <a:ln>
+          <a:noFill/>
+        </a:ln>
+        <a:effectLst/>
+      </c:spPr>
+      <c:txPr>
+        <a:bodyPr rot="0" spcFirstLastPara="1" vertOverflow="ellipsis" vert="horz" wrap="square" anchor="ctr" anchorCtr="1"/>
+        <a:lstStyle/>
+        <a:p>
+          <a:pPr>
+            <a:defRPr sz="1862" b="0" i="0" u="none" strike="noStrike" kern="1200" spc="0" baseline="0">
+              <a:solidFill>
+                <a:schemeClr val="tx1">
+                  <a:lumMod val="65000"/>
+                  <a:lumOff val="35000"/>
+                </a:schemeClr>
+              </a:solidFill>
+              <a:latin typeface="+mn-lt"/>
+              <a:ea typeface="+mn-ea"/>
+              <a:cs typeface="+mn-cs"/>
+            </a:defRPr>
+          </a:pPr>
+          <a:endParaRPr lang="pt-PT"/>
+        </a:p>
+      </c:txPr>
+    </c:title>
+    <c:autoTitleDeleted val="0"/>
+    <c:plotArea>
+      <c:layout>
+        <c:manualLayout>
+          <c:layoutTarget val="inner"/>
+          <c:xMode val="edge"/>
+          <c:yMode val="edge"/>
+          <c:x val="7.8623822410320066E-2"/>
+          <c:y val="0.17445654519993742"/>
+          <c:w val="0.87732928302291646"/>
+          <c:h val="0.70553536013426588"/>
+        </c:manualLayout>
+      </c:layout>
+      <c:lineChart>
+        <c:grouping val="standard"/>
+        <c:varyColors val="0"/>
+        <c:ser>
+          <c:idx val="0"/>
+          <c:order val="0"/>
+          <c:tx>
+            <c:strRef>
+              <c:f>Folha1!$B$1</c:f>
+              <c:strCache>
+                <c:ptCount val="1"/>
+                <c:pt idx="0">
+                  <c:v>Burndown Real</c:v>
+                </c:pt>
+              </c:strCache>
+            </c:strRef>
+          </c:tx>
+          <c:spPr>
+            <a:ln w="28575" cap="rnd">
+              <a:solidFill>
+                <a:schemeClr val="accent1"/>
+              </a:solidFill>
+              <a:round/>
+            </a:ln>
+            <a:effectLst/>
+          </c:spPr>
+          <c:marker>
+            <c:symbol val="none"/>
+          </c:marker>
+          <c:cat>
+            <c:numRef>
+              <c:f>Folha1!$A$2:$A$8</c:f>
+              <c:numCache>
+                <c:formatCode>General</c:formatCode>
+                <c:ptCount val="7"/>
+              </c:numCache>
+            </c:numRef>
+          </c:cat>
+          <c:val>
+            <c:numRef>
+              <c:f>Folha1!$B$2:$B$8</c:f>
+              <c:numCache>
+                <c:formatCode>General</c:formatCode>
+                <c:ptCount val="7"/>
+                <c:pt idx="1">
+                  <c:v>18</c:v>
+                </c:pt>
+                <c:pt idx="2">
+                  <c:v>15</c:v>
+                </c:pt>
+                <c:pt idx="3">
+                  <c:v>13</c:v>
+                </c:pt>
+                <c:pt idx="4">
+                  <c:v>8</c:v>
+                </c:pt>
+                <c:pt idx="5">
+                  <c:v>5</c:v>
+                </c:pt>
+                <c:pt idx="6">
+                  <c:v>0</c:v>
+                </c:pt>
+              </c:numCache>
+            </c:numRef>
+          </c:val>
+          <c:smooth val="0"/>
+          <c:extLst>
+            <c:ext xmlns:c16="http://schemas.microsoft.com/office/drawing/2014/chart" uri="{C3380CC4-5D6E-409C-BE32-E72D297353CC}">
+              <c16:uniqueId val="{00000000-A6FE-4702-B469-D950EAB24690}"/>
+            </c:ext>
+          </c:extLst>
+        </c:ser>
+        <c:ser>
+          <c:idx val="1"/>
+          <c:order val="1"/>
+          <c:tx>
+            <c:strRef>
+              <c:f>Folha1!$C$1</c:f>
+              <c:strCache>
+                <c:ptCount val="1"/>
+                <c:pt idx="0">
+                  <c:v>Expectativa</c:v>
+                </c:pt>
+              </c:strCache>
+            </c:strRef>
+          </c:tx>
+          <c:spPr>
+            <a:ln w="28575" cap="rnd">
+              <a:solidFill>
+                <a:schemeClr val="accent2"/>
+              </a:solidFill>
+              <a:round/>
+            </a:ln>
+            <a:effectLst/>
+          </c:spPr>
+          <c:marker>
+            <c:symbol val="none"/>
+          </c:marker>
+          <c:cat>
+            <c:numRef>
+              <c:f>Folha1!$A$2:$A$8</c:f>
+              <c:numCache>
+                <c:formatCode>General</c:formatCode>
+                <c:ptCount val="7"/>
+              </c:numCache>
+            </c:numRef>
+          </c:cat>
+          <c:val>
+            <c:numRef>
+              <c:f>Folha1!$C$2:$C$8</c:f>
+              <c:numCache>
+                <c:formatCode>General</c:formatCode>
+                <c:ptCount val="7"/>
+                <c:pt idx="1">
+                  <c:v>15</c:v>
+                </c:pt>
+                <c:pt idx="2">
+                  <c:v>8</c:v>
+                </c:pt>
+                <c:pt idx="3">
+                  <c:v>2</c:v>
+                </c:pt>
+                <c:pt idx="4">
+                  <c:v>2</c:v>
+                </c:pt>
+                <c:pt idx="5">
+                  <c:v>0</c:v>
+                </c:pt>
+                <c:pt idx="6">
+                  <c:v>0</c:v>
+                </c:pt>
+              </c:numCache>
+            </c:numRef>
+          </c:val>
+          <c:smooth val="0"/>
+          <c:extLst>
+            <c:ext xmlns:c16="http://schemas.microsoft.com/office/drawing/2014/chart" uri="{C3380CC4-5D6E-409C-BE32-E72D297353CC}">
+              <c16:uniqueId val="{00000001-A6FE-4702-B469-D950EAB24690}"/>
+            </c:ext>
+          </c:extLst>
+        </c:ser>
+        <c:dLbls>
+          <c:showLegendKey val="0"/>
+          <c:showVal val="0"/>
+          <c:showCatName val="0"/>
+          <c:showSerName val="0"/>
+          <c:showPercent val="0"/>
+          <c:showBubbleSize val="0"/>
+        </c:dLbls>
+        <c:smooth val="0"/>
+        <c:axId val="242651824"/>
+        <c:axId val="247889520"/>
+      </c:lineChart>
+      <c:catAx>
+        <c:axId val="242651824"/>
+        <c:scaling>
+          <c:orientation val="minMax"/>
+        </c:scaling>
+        <c:delete val="0"/>
+        <c:axPos val="b"/>
+        <c:numFmt formatCode="General" sourceLinked="1"/>
+        <c:majorTickMark val="none"/>
+        <c:minorTickMark val="none"/>
+        <c:tickLblPos val="nextTo"/>
+        <c:spPr>
+          <a:noFill/>
+          <a:ln w="9525" cap="flat" cmpd="sng" algn="ctr">
+            <a:solidFill>
+              <a:schemeClr val="tx1">
+                <a:lumMod val="15000"/>
+                <a:lumOff val="85000"/>
+              </a:schemeClr>
+            </a:solidFill>
+            <a:round/>
+          </a:ln>
+          <a:effectLst/>
+        </c:spPr>
+        <c:txPr>
+          <a:bodyPr rot="-60000000" spcFirstLastPara="1" vertOverflow="ellipsis" vert="horz" wrap="square" anchor="ctr" anchorCtr="1"/>
+          <a:lstStyle/>
+          <a:p>
+            <a:pPr>
+              <a:defRPr sz="1197" b="0" i="0" u="none" strike="noStrike" kern="1200" baseline="0">
+                <a:solidFill>
+                  <a:schemeClr val="tx1">
+                    <a:lumMod val="65000"/>
+                    <a:lumOff val="35000"/>
+                  </a:schemeClr>
+                </a:solidFill>
+                <a:latin typeface="+mn-lt"/>
+                <a:ea typeface="+mn-ea"/>
+                <a:cs typeface="+mn-cs"/>
+              </a:defRPr>
+            </a:pPr>
+            <a:endParaRPr lang="pt-PT"/>
+          </a:p>
+        </c:txPr>
+        <c:crossAx val="247889520"/>
+        <c:crosses val="autoZero"/>
+        <c:auto val="1"/>
+        <c:lblAlgn val="ctr"/>
+        <c:lblOffset val="100"/>
+        <c:noMultiLvlLbl val="0"/>
+      </c:catAx>
+      <c:valAx>
+        <c:axId val="247889520"/>
+        <c:scaling>
+          <c:orientation val="minMax"/>
+        </c:scaling>
+        <c:delete val="0"/>
+        <c:axPos val="l"/>
+        <c:majorGridlines>
+          <c:spPr>
+            <a:ln w="9525" cap="flat" cmpd="sng" algn="ctr">
+              <a:solidFill>
+                <a:schemeClr val="tx1">
+                  <a:lumMod val="15000"/>
+                  <a:lumOff val="85000"/>
+                </a:schemeClr>
+              </a:solidFill>
+              <a:round/>
+            </a:ln>
+            <a:effectLst/>
+          </c:spPr>
+        </c:majorGridlines>
+        <c:numFmt formatCode="General" sourceLinked="1"/>
+        <c:majorTickMark val="none"/>
+        <c:minorTickMark val="none"/>
+        <c:tickLblPos val="nextTo"/>
+        <c:spPr>
+          <a:noFill/>
+          <a:ln>
+            <a:noFill/>
+          </a:ln>
+          <a:effectLst/>
+        </c:spPr>
+        <c:txPr>
+          <a:bodyPr rot="-60000000" spcFirstLastPara="1" vertOverflow="ellipsis" vert="horz" wrap="square" anchor="ctr" anchorCtr="1"/>
+          <a:lstStyle/>
+          <a:p>
+            <a:pPr>
+              <a:defRPr sz="1197" b="0" i="0" u="none" strike="noStrike" kern="1200" baseline="0">
+                <a:solidFill>
+                  <a:schemeClr val="tx1">
+                    <a:lumMod val="65000"/>
+                    <a:lumOff val="35000"/>
+                  </a:schemeClr>
+                </a:solidFill>
+                <a:latin typeface="+mn-lt"/>
+                <a:ea typeface="+mn-ea"/>
+                <a:cs typeface="+mn-cs"/>
+              </a:defRPr>
+            </a:pPr>
+            <a:endParaRPr lang="pt-PT"/>
+          </a:p>
+        </c:txPr>
+        <c:crossAx val="242651824"/>
+        <c:crosses val="autoZero"/>
+        <c:crossBetween val="between"/>
+      </c:valAx>
+      <c:spPr>
+        <a:noFill/>
+        <a:ln>
+          <a:noFill/>
+        </a:ln>
+        <a:effectLst/>
+      </c:spPr>
+    </c:plotArea>
+    <c:legend>
+      <c:legendPos val="b"/>
+      <c:overlay val="0"/>
+      <c:spPr>
+        <a:noFill/>
+        <a:ln>
+          <a:noFill/>
+        </a:ln>
+        <a:effectLst/>
+      </c:spPr>
+      <c:txPr>
+        <a:bodyPr rot="0" spcFirstLastPara="1" vertOverflow="ellipsis" vert="horz" wrap="square" anchor="ctr" anchorCtr="1"/>
+        <a:lstStyle/>
+        <a:p>
+          <a:pPr>
+            <a:defRPr sz="1197" b="0" i="0" u="none" strike="noStrike" kern="1200" baseline="0">
+              <a:solidFill>
+                <a:schemeClr val="tx1">
+                  <a:lumMod val="65000"/>
+                  <a:lumOff val="35000"/>
+                </a:schemeClr>
+              </a:solidFill>
+              <a:latin typeface="+mn-lt"/>
+              <a:ea typeface="+mn-ea"/>
+              <a:cs typeface="+mn-cs"/>
+            </a:defRPr>
+          </a:pPr>
+          <a:endParaRPr lang="pt-PT"/>
+        </a:p>
+      </c:txPr>
+    </c:legend>
+    <c:plotVisOnly val="1"/>
+    <c:dispBlanksAs val="gap"/>
+    <c:extLst>
+      <c:ext xmlns:c16r3="http://schemas.microsoft.com/office/drawing/2017/03/chart" uri="{56B9EC1D-385E-4148-901F-78D8002777C0}">
+        <c16r3:dataDisplayOptions16>
+          <c16r3:dispNaAsBlank val="1"/>
+        </c16r3:dataDisplayOptions16>
+      </c:ext>
+    </c:extLst>
+    <c:showDLblsOverMax val="0"/>
+  </c:chart>
+  <c:spPr>
+    <a:noFill/>
+    <a:ln>
+      <a:noFill/>
+    </a:ln>
+    <a:effectLst/>
+  </c:spPr>
+  <c:txPr>
+    <a:bodyPr/>
+    <a:lstStyle/>
+    <a:p>
+      <a:pPr>
+        <a:defRPr/>
+      </a:pPr>
+      <a:endParaRPr lang="pt-PT"/>
+    </a:p>
+  </c:txPr>
+  <c:externalData r:id="rId3">
+    <c:autoUpdate val="0"/>
+  </c:externalData>
+</c:chartSpace>
+</file>
+
+<file path=ppt/charts/chart4.xml><?xml version="1.0" encoding="utf-8"?>
+<c:chartSpace xmlns:c="http://schemas.openxmlformats.org/drawingml/2006/chart" xmlns:a="http://schemas.openxmlformats.org/drawingml/2006/main" xmlns:r="http://schemas.openxmlformats.org/officeDocument/2006/relationships" xmlns:c16r2="http://schemas.microsoft.com/office/drawing/2015/06/chart">
+  <c:date1904 val="0"/>
+  <c:lang val="pt-PT"/>
+  <c:roundedCorners val="0"/>
+  <mc:AlternateContent xmlns:mc="http://schemas.openxmlformats.org/markup-compatibility/2006">
+    <mc:Choice xmlns:c14="http://schemas.microsoft.com/office/drawing/2007/8/2/chart" Requires="c14">
+      <c14:style val="102"/>
+    </mc:Choice>
+    <mc:Fallback>
+      <c:style val="2"/>
+    </mc:Fallback>
+  </mc:AlternateContent>
+  <c:chart>
+    <c:title>
+      <c:tx>
+        <c:rich>
+          <a:bodyPr rot="0" spcFirstLastPara="1" vertOverflow="ellipsis" vert="horz" wrap="square" anchor="ctr" anchorCtr="1"/>
+          <a:lstStyle/>
+          <a:p>
+            <a:pPr>
+              <a:defRPr sz="1862" b="0" i="0" u="none" strike="noStrike" kern="1200" spc="0" baseline="0">
+                <a:solidFill>
+                  <a:schemeClr val="tx1">
+                    <a:lumMod val="65000"/>
+                    <a:lumOff val="35000"/>
+                  </a:schemeClr>
+                </a:solidFill>
+                <a:latin typeface="+mn-lt"/>
+                <a:ea typeface="+mn-ea"/>
+                <a:cs typeface="+mn-cs"/>
+              </a:defRPr>
+            </a:pPr>
+            <a:r>
+              <a:rPr lang="pt-PT" dirty="0" err="1"/>
+              <a:t>Burndown</a:t>
+            </a:r>
+            <a:r>
+              <a:rPr lang="pt-PT" dirty="0"/>
+              <a:t> </a:t>
+            </a:r>
+            <a:r>
+              <a:rPr lang="pt-PT" dirty="0" err="1"/>
+              <a:t>Chart</a:t>
+            </a:r>
+            <a:endParaRPr lang="pt-PT" dirty="0"/>
+          </a:p>
+        </c:rich>
+      </c:tx>
+      <c:layout>
+        <c:manualLayout>
+          <c:xMode val="edge"/>
+          <c:yMode val="edge"/>
+          <c:x val="0.30938948415584488"/>
+          <c:y val="3.4162039249582839E-2"/>
+        </c:manualLayout>
+      </c:layout>
+      <c:overlay val="0"/>
+      <c:spPr>
+        <a:solidFill>
+          <a:schemeClr val="bg2"/>
+        </a:solidFill>
+        <a:ln>
+          <a:noFill/>
+        </a:ln>
+        <a:effectLst/>
+      </c:spPr>
+      <c:txPr>
+        <a:bodyPr rot="0" spcFirstLastPara="1" vertOverflow="ellipsis" vert="horz" wrap="square" anchor="ctr" anchorCtr="1"/>
+        <a:lstStyle/>
+        <a:p>
+          <a:pPr>
+            <a:defRPr sz="1862" b="0" i="0" u="none" strike="noStrike" kern="1200" spc="0" baseline="0">
+              <a:solidFill>
+                <a:schemeClr val="tx1">
+                  <a:lumMod val="65000"/>
+                  <a:lumOff val="35000"/>
+                </a:schemeClr>
+              </a:solidFill>
+              <a:latin typeface="+mn-lt"/>
+              <a:ea typeface="+mn-ea"/>
+              <a:cs typeface="+mn-cs"/>
+            </a:defRPr>
+          </a:pPr>
+          <a:endParaRPr lang="pt-PT"/>
+        </a:p>
+      </c:txPr>
+    </c:title>
+    <c:autoTitleDeleted val="0"/>
+    <c:plotArea>
+      <c:layout>
+        <c:manualLayout>
+          <c:layoutTarget val="inner"/>
+          <c:xMode val="edge"/>
+          <c:yMode val="edge"/>
+          <c:x val="7.8623822410320066E-2"/>
+          <c:y val="0.17445654519993742"/>
+          <c:w val="0.87732928302291646"/>
+          <c:h val="0.70553536013426588"/>
+        </c:manualLayout>
+      </c:layout>
+      <c:lineChart>
+        <c:grouping val="standard"/>
+        <c:varyColors val="0"/>
+        <c:ser>
+          <c:idx val="0"/>
+          <c:order val="0"/>
+          <c:tx>
+            <c:strRef>
+              <c:f>Folha1!$B$1</c:f>
+              <c:strCache>
+                <c:ptCount val="1"/>
+                <c:pt idx="0">
+                  <c:v>Burndown Real</c:v>
+                </c:pt>
+              </c:strCache>
+            </c:strRef>
+          </c:tx>
+          <c:spPr>
+            <a:ln w="28575" cap="rnd">
+              <a:solidFill>
+                <a:schemeClr val="accent1"/>
+              </a:solidFill>
+              <a:round/>
+            </a:ln>
+            <a:effectLst/>
+          </c:spPr>
+          <c:marker>
+            <c:symbol val="none"/>
+          </c:marker>
+          <c:cat>
+            <c:numRef>
+              <c:f>Folha1!$A$2:$A$8</c:f>
+              <c:numCache>
+                <c:formatCode>General</c:formatCode>
+                <c:ptCount val="7"/>
+              </c:numCache>
+            </c:numRef>
+          </c:cat>
+          <c:val>
+            <c:numRef>
+              <c:f>Folha1!$B$2:$B$8</c:f>
+              <c:numCache>
+                <c:formatCode>General</c:formatCode>
+                <c:ptCount val="7"/>
+                <c:pt idx="0">
+                  <c:v>22</c:v>
+                </c:pt>
+                <c:pt idx="1">
+                  <c:v>17</c:v>
+                </c:pt>
+                <c:pt idx="2">
+                  <c:v>15</c:v>
+                </c:pt>
+                <c:pt idx="3">
+                  <c:v>13</c:v>
+                </c:pt>
+                <c:pt idx="4">
+                  <c:v>8</c:v>
+                </c:pt>
+                <c:pt idx="5">
+                  <c:v>5</c:v>
+                </c:pt>
+                <c:pt idx="6">
+                  <c:v>0</c:v>
+                </c:pt>
+              </c:numCache>
+            </c:numRef>
+          </c:val>
+          <c:smooth val="0"/>
+          <c:extLst>
+            <c:ext xmlns:c16="http://schemas.microsoft.com/office/drawing/2014/chart" uri="{C3380CC4-5D6E-409C-BE32-E72D297353CC}">
+              <c16:uniqueId val="{00000000-8F86-4861-A670-156838D640DF}"/>
+            </c:ext>
+          </c:extLst>
+        </c:ser>
+        <c:ser>
+          <c:idx val="1"/>
+          <c:order val="1"/>
+          <c:tx>
+            <c:strRef>
+              <c:f>Folha1!$C$1</c:f>
+              <c:strCache>
+                <c:ptCount val="1"/>
+                <c:pt idx="0">
+                  <c:v>Expectativa</c:v>
+                </c:pt>
+              </c:strCache>
+            </c:strRef>
+          </c:tx>
+          <c:spPr>
+            <a:ln w="28575" cap="rnd">
+              <a:solidFill>
+                <a:schemeClr val="accent2"/>
+              </a:solidFill>
+              <a:round/>
+            </a:ln>
+            <a:effectLst/>
+          </c:spPr>
+          <c:marker>
+            <c:symbol val="none"/>
+          </c:marker>
+          <c:cat>
+            <c:numRef>
+              <c:f>Folha1!$A$2:$A$8</c:f>
+              <c:numCache>
+                <c:formatCode>General</c:formatCode>
+                <c:ptCount val="7"/>
+              </c:numCache>
+            </c:numRef>
+          </c:cat>
+          <c:val>
+            <c:numRef>
+              <c:f>Folha1!$C$2:$C$8</c:f>
+              <c:numCache>
+                <c:formatCode>General</c:formatCode>
+                <c:ptCount val="7"/>
+                <c:pt idx="0">
+                  <c:v>20</c:v>
+                </c:pt>
+                <c:pt idx="1">
+                  <c:v>15</c:v>
+                </c:pt>
+                <c:pt idx="2">
+                  <c:v>8</c:v>
+                </c:pt>
+                <c:pt idx="3">
+                  <c:v>2</c:v>
+                </c:pt>
+                <c:pt idx="4">
+                  <c:v>2</c:v>
+                </c:pt>
+                <c:pt idx="5">
+                  <c:v>0</c:v>
+                </c:pt>
+                <c:pt idx="6">
+                  <c:v>0</c:v>
+                </c:pt>
+              </c:numCache>
+            </c:numRef>
+          </c:val>
+          <c:smooth val="0"/>
+          <c:extLst>
+            <c:ext xmlns:c16="http://schemas.microsoft.com/office/drawing/2014/chart" uri="{C3380CC4-5D6E-409C-BE32-E72D297353CC}">
+              <c16:uniqueId val="{00000001-8F86-4861-A670-156838D640DF}"/>
+            </c:ext>
+          </c:extLst>
+        </c:ser>
+        <c:dLbls>
+          <c:showLegendKey val="0"/>
+          <c:showVal val="0"/>
+          <c:showCatName val="0"/>
+          <c:showSerName val="0"/>
+          <c:showPercent val="0"/>
+          <c:showBubbleSize val="0"/>
+        </c:dLbls>
+        <c:smooth val="0"/>
+        <c:axId val="242651824"/>
+        <c:axId val="247889520"/>
+      </c:lineChart>
+      <c:catAx>
+        <c:axId val="242651824"/>
+        <c:scaling>
+          <c:orientation val="minMax"/>
+        </c:scaling>
+        <c:delete val="0"/>
+        <c:axPos val="b"/>
+        <c:numFmt formatCode="General" sourceLinked="1"/>
+        <c:majorTickMark val="none"/>
+        <c:minorTickMark val="none"/>
+        <c:tickLblPos val="nextTo"/>
+        <c:spPr>
+          <a:noFill/>
+          <a:ln w="9525" cap="flat" cmpd="sng" algn="ctr">
+            <a:solidFill>
+              <a:schemeClr val="tx1">
+                <a:lumMod val="15000"/>
+                <a:lumOff val="85000"/>
+              </a:schemeClr>
+            </a:solidFill>
+            <a:round/>
+          </a:ln>
+          <a:effectLst/>
+        </c:spPr>
+        <c:txPr>
+          <a:bodyPr rot="-60000000" spcFirstLastPara="1" vertOverflow="ellipsis" vert="horz" wrap="square" anchor="ctr" anchorCtr="1"/>
+          <a:lstStyle/>
+          <a:p>
+            <a:pPr>
+              <a:defRPr sz="1197" b="0" i="0" u="none" strike="noStrike" kern="1200" baseline="0">
+                <a:solidFill>
+                  <a:schemeClr val="tx1">
+                    <a:lumMod val="65000"/>
+                    <a:lumOff val="35000"/>
+                  </a:schemeClr>
+                </a:solidFill>
+                <a:latin typeface="+mn-lt"/>
+                <a:ea typeface="+mn-ea"/>
+                <a:cs typeface="+mn-cs"/>
+              </a:defRPr>
+            </a:pPr>
+            <a:endParaRPr lang="pt-PT"/>
+          </a:p>
+        </c:txPr>
+        <c:crossAx val="247889520"/>
+        <c:crosses val="autoZero"/>
+        <c:auto val="1"/>
+        <c:lblAlgn val="ctr"/>
+        <c:lblOffset val="100"/>
+        <c:noMultiLvlLbl val="0"/>
+      </c:catAx>
+      <c:valAx>
+        <c:axId val="247889520"/>
+        <c:scaling>
+          <c:orientation val="minMax"/>
+        </c:scaling>
+        <c:delete val="0"/>
+        <c:axPos val="l"/>
+        <c:majorGridlines>
+          <c:spPr>
+            <a:ln w="9525" cap="flat" cmpd="sng" algn="ctr">
+              <a:solidFill>
+                <a:schemeClr val="tx1">
+                  <a:lumMod val="15000"/>
+                  <a:lumOff val="85000"/>
+                </a:schemeClr>
+              </a:solidFill>
+              <a:round/>
+            </a:ln>
+            <a:effectLst/>
+          </c:spPr>
+        </c:majorGridlines>
+        <c:numFmt formatCode="General" sourceLinked="1"/>
+        <c:majorTickMark val="none"/>
+        <c:minorTickMark val="none"/>
+        <c:tickLblPos val="nextTo"/>
+        <c:spPr>
+          <a:noFill/>
+          <a:ln>
+            <a:noFill/>
+          </a:ln>
+          <a:effectLst/>
+        </c:spPr>
+        <c:txPr>
+          <a:bodyPr rot="-60000000" spcFirstLastPara="1" vertOverflow="ellipsis" vert="horz" wrap="square" anchor="ctr" anchorCtr="1"/>
+          <a:lstStyle/>
+          <a:p>
+            <a:pPr>
+              <a:defRPr sz="1197" b="0" i="0" u="none" strike="noStrike" kern="1200" baseline="0">
+                <a:solidFill>
+                  <a:schemeClr val="tx1">
+                    <a:lumMod val="65000"/>
+                    <a:lumOff val="35000"/>
+                  </a:schemeClr>
+                </a:solidFill>
+                <a:latin typeface="+mn-lt"/>
+                <a:ea typeface="+mn-ea"/>
+                <a:cs typeface="+mn-cs"/>
+              </a:defRPr>
+            </a:pPr>
+            <a:endParaRPr lang="pt-PT"/>
+          </a:p>
+        </c:txPr>
+        <c:crossAx val="242651824"/>
+        <c:crosses val="autoZero"/>
+        <c:crossBetween val="between"/>
+      </c:valAx>
+      <c:spPr>
+        <a:noFill/>
+        <a:ln>
+          <a:noFill/>
+        </a:ln>
+        <a:effectLst/>
+      </c:spPr>
+    </c:plotArea>
+    <c:legend>
+      <c:legendPos val="b"/>
+      <c:overlay val="0"/>
+      <c:spPr>
+        <a:noFill/>
+        <a:ln>
+          <a:noFill/>
+        </a:ln>
+        <a:effectLst/>
+      </c:spPr>
+      <c:txPr>
+        <a:bodyPr rot="0" spcFirstLastPara="1" vertOverflow="ellipsis" vert="horz" wrap="square" anchor="ctr" anchorCtr="1"/>
+        <a:lstStyle/>
+        <a:p>
+          <a:pPr>
+            <a:defRPr sz="1197" b="0" i="0" u="none" strike="noStrike" kern="1200" baseline="0">
+              <a:solidFill>
+                <a:schemeClr val="tx1">
+                  <a:lumMod val="65000"/>
+                  <a:lumOff val="35000"/>
+                </a:schemeClr>
+              </a:solidFill>
+              <a:latin typeface="+mn-lt"/>
+              <a:ea typeface="+mn-ea"/>
+              <a:cs typeface="+mn-cs"/>
+            </a:defRPr>
+          </a:pPr>
+          <a:endParaRPr lang="pt-PT"/>
+        </a:p>
+      </c:txPr>
+    </c:legend>
+    <c:plotVisOnly val="1"/>
+    <c:dispBlanksAs val="gap"/>
+    <c:extLst>
+      <c:ext xmlns:c16r3="http://schemas.microsoft.com/office/drawing/2017/03/chart" uri="{56B9EC1D-385E-4148-901F-78D8002777C0}">
+        <c16r3:dataDisplayOptions16>
+          <c16r3:dispNaAsBlank val="1"/>
+        </c16r3:dataDisplayOptions16>
+      </c:ext>
+    </c:extLst>
+    <c:showDLblsOverMax val="0"/>
+  </c:chart>
+  <c:spPr>
+    <a:noFill/>
+    <a:ln>
+      <a:noFill/>
+    </a:ln>
+    <a:effectLst/>
+  </c:spPr>
+  <c:txPr>
+    <a:bodyPr/>
+    <a:lstStyle/>
+    <a:p>
+      <a:pPr>
+        <a:defRPr/>
+      </a:pPr>
+      <a:endParaRPr lang="pt-PT"/>
+    </a:p>
+  </c:txPr>
+  <c:externalData r:id="rId3">
+    <c:autoUpdate val="0"/>
+  </c:externalData>
+</c:chartSpace>
+</file>
+
 <file path=ppt/charts/colors1.xml><?xml version="1.0" encoding="utf-8"?>
 <cs:colorStyle xmlns:cs="http://schemas.microsoft.com/office/drawing/2012/chartStyle" xmlns:a="http://schemas.openxmlformats.org/drawingml/2006/main" meth="cycle" id="10">
   <a:schemeClr val="accent1"/>
@@ -1078,6 +1960,86 @@
 </file>
 
 <file path=ppt/charts/colors2.xml><?xml version="1.0" encoding="utf-8"?>
+<cs:colorStyle xmlns:cs="http://schemas.microsoft.com/office/drawing/2012/chartStyle" xmlns:a="http://schemas.openxmlformats.org/drawingml/2006/main" meth="cycle" id="10">
+  <a:schemeClr val="accent1"/>
+  <a:schemeClr val="accent2"/>
+  <a:schemeClr val="accent3"/>
+  <a:schemeClr val="accent4"/>
+  <a:schemeClr val="accent5"/>
+  <a:schemeClr val="accent6"/>
+  <cs:variation/>
+  <cs:variation>
+    <a:lumMod val="60000"/>
+  </cs:variation>
+  <cs:variation>
+    <a:lumMod val="80000"/>
+    <a:lumOff val="20000"/>
+  </cs:variation>
+  <cs:variation>
+    <a:lumMod val="80000"/>
+  </cs:variation>
+  <cs:variation>
+    <a:lumMod val="60000"/>
+    <a:lumOff val="40000"/>
+  </cs:variation>
+  <cs:variation>
+    <a:lumMod val="50000"/>
+  </cs:variation>
+  <cs:variation>
+    <a:lumMod val="70000"/>
+    <a:lumOff val="30000"/>
+  </cs:variation>
+  <cs:variation>
+    <a:lumMod val="70000"/>
+  </cs:variation>
+  <cs:variation>
+    <a:lumMod val="50000"/>
+    <a:lumOff val="50000"/>
+  </cs:variation>
+</cs:colorStyle>
+</file>
+
+<file path=ppt/charts/colors3.xml><?xml version="1.0" encoding="utf-8"?>
+<cs:colorStyle xmlns:cs="http://schemas.microsoft.com/office/drawing/2012/chartStyle" xmlns:a="http://schemas.openxmlformats.org/drawingml/2006/main" meth="cycle" id="10">
+  <a:schemeClr val="accent1"/>
+  <a:schemeClr val="accent2"/>
+  <a:schemeClr val="accent3"/>
+  <a:schemeClr val="accent4"/>
+  <a:schemeClr val="accent5"/>
+  <a:schemeClr val="accent6"/>
+  <cs:variation/>
+  <cs:variation>
+    <a:lumMod val="60000"/>
+  </cs:variation>
+  <cs:variation>
+    <a:lumMod val="80000"/>
+    <a:lumOff val="20000"/>
+  </cs:variation>
+  <cs:variation>
+    <a:lumMod val="80000"/>
+  </cs:variation>
+  <cs:variation>
+    <a:lumMod val="60000"/>
+    <a:lumOff val="40000"/>
+  </cs:variation>
+  <cs:variation>
+    <a:lumMod val="50000"/>
+  </cs:variation>
+  <cs:variation>
+    <a:lumMod val="70000"/>
+    <a:lumOff val="30000"/>
+  </cs:variation>
+  <cs:variation>
+    <a:lumMod val="70000"/>
+  </cs:variation>
+  <cs:variation>
+    <a:lumMod val="50000"/>
+    <a:lumOff val="50000"/>
+  </cs:variation>
+</cs:colorStyle>
+</file>
+
+<file path=ppt/charts/colors4.xml><?xml version="1.0" encoding="utf-8"?>
 <cs:colorStyle xmlns:cs="http://schemas.microsoft.com/office/drawing/2012/chartStyle" xmlns:a="http://schemas.openxmlformats.org/drawingml/2006/main" meth="cycle" id="10">
   <a:schemeClr val="accent1"/>
   <a:schemeClr val="accent2"/>
@@ -2149,6 +3111,1038 @@
 </cs:chartStyle>
 </file>
 
+<file path=ppt/charts/style3.xml><?xml version="1.0" encoding="utf-8"?>
+<cs:chartStyle xmlns:cs="http://schemas.microsoft.com/office/drawing/2012/chartStyle" xmlns:a="http://schemas.openxmlformats.org/drawingml/2006/main" id="227">
+  <cs:axisTitle>
+    <cs:lnRef idx="0"/>
+    <cs:fillRef idx="0"/>
+    <cs:effectRef idx="0"/>
+    <cs:fontRef idx="minor">
+      <a:schemeClr val="tx1">
+        <a:lumMod val="65000"/>
+        <a:lumOff val="35000"/>
+      </a:schemeClr>
+    </cs:fontRef>
+    <cs:defRPr sz="1330" kern="1200"/>
+  </cs:axisTitle>
+  <cs:categoryAxis>
+    <cs:lnRef idx="0"/>
+    <cs:fillRef idx="0"/>
+    <cs:effectRef idx="0"/>
+    <cs:fontRef idx="minor">
+      <a:schemeClr val="tx1">
+        <a:lumMod val="65000"/>
+        <a:lumOff val="35000"/>
+      </a:schemeClr>
+    </cs:fontRef>
+    <cs:spPr>
+      <a:ln w="9525" cap="flat" cmpd="sng" algn="ctr">
+        <a:solidFill>
+          <a:schemeClr val="tx1">
+            <a:lumMod val="15000"/>
+            <a:lumOff val="85000"/>
+          </a:schemeClr>
+        </a:solidFill>
+        <a:round/>
+      </a:ln>
+    </cs:spPr>
+    <cs:defRPr sz="1197" kern="1200"/>
+  </cs:categoryAxis>
+  <cs:chartArea mods="allowNoFillOverride allowNoLineOverride">
+    <cs:lnRef idx="0"/>
+    <cs:fillRef idx="0"/>
+    <cs:effectRef idx="0"/>
+    <cs:fontRef idx="minor">
+      <a:schemeClr val="tx1"/>
+    </cs:fontRef>
+    <cs:spPr>
+      <a:solidFill>
+        <a:schemeClr val="bg1"/>
+      </a:solidFill>
+      <a:ln w="9525" cap="flat" cmpd="sng" algn="ctr">
+        <a:solidFill>
+          <a:schemeClr val="tx1">
+            <a:lumMod val="15000"/>
+            <a:lumOff val="85000"/>
+          </a:schemeClr>
+        </a:solidFill>
+        <a:round/>
+      </a:ln>
+    </cs:spPr>
+    <cs:defRPr sz="1330" kern="1200"/>
+  </cs:chartArea>
+  <cs:dataLabel>
+    <cs:lnRef idx="0"/>
+    <cs:fillRef idx="0"/>
+    <cs:effectRef idx="0"/>
+    <cs:fontRef idx="minor">
+      <a:schemeClr val="tx1">
+        <a:lumMod val="75000"/>
+        <a:lumOff val="25000"/>
+      </a:schemeClr>
+    </cs:fontRef>
+    <cs:defRPr sz="1197" kern="1200"/>
+  </cs:dataLabel>
+  <cs:dataLabelCallout>
+    <cs:lnRef idx="0"/>
+    <cs:fillRef idx="0"/>
+    <cs:effectRef idx="0"/>
+    <cs:fontRef idx="minor">
+      <a:schemeClr val="dk1">
+        <a:lumMod val="65000"/>
+        <a:lumOff val="35000"/>
+      </a:schemeClr>
+    </cs:fontRef>
+    <cs:spPr>
+      <a:solidFill>
+        <a:schemeClr val="lt1"/>
+      </a:solidFill>
+      <a:ln>
+        <a:solidFill>
+          <a:schemeClr val="dk1">
+            <a:lumMod val="25000"/>
+            <a:lumOff val="75000"/>
+          </a:schemeClr>
+        </a:solidFill>
+      </a:ln>
+    </cs:spPr>
+    <cs:defRPr sz="1197" kern="1200"/>
+    <cs:bodyPr rot="0" spcFirstLastPara="1" vertOverflow="clip" horzOverflow="clip" vert="horz" wrap="square" lIns="36576" tIns="18288" rIns="36576" bIns="18288" anchor="ctr" anchorCtr="1">
+      <a:spAutoFit/>
+    </cs:bodyPr>
+  </cs:dataLabelCallout>
+  <cs:dataPoint>
+    <cs:lnRef idx="0"/>
+    <cs:fillRef idx="1">
+      <cs:styleClr val="auto"/>
+    </cs:fillRef>
+    <cs:effectRef idx="0"/>
+    <cs:fontRef idx="minor">
+      <a:schemeClr val="tx1"/>
+    </cs:fontRef>
+    <cs:spPr>
+      <a:solidFill>
+        <a:schemeClr val="phClr"/>
+      </a:solidFill>
+    </cs:spPr>
+  </cs:dataPoint>
+  <cs:dataPoint3D>
+    <cs:lnRef idx="0"/>
+    <cs:fillRef idx="1">
+      <cs:styleClr val="auto"/>
+    </cs:fillRef>
+    <cs:effectRef idx="0"/>
+    <cs:fontRef idx="minor">
+      <a:schemeClr val="tx1"/>
+    </cs:fontRef>
+    <cs:spPr>
+      <a:solidFill>
+        <a:schemeClr val="phClr"/>
+      </a:solidFill>
+    </cs:spPr>
+  </cs:dataPoint3D>
+  <cs:dataPointLine>
+    <cs:lnRef idx="0">
+      <cs:styleClr val="auto"/>
+    </cs:lnRef>
+    <cs:fillRef idx="1"/>
+    <cs:effectRef idx="0"/>
+    <cs:fontRef idx="minor">
+      <a:schemeClr val="tx1"/>
+    </cs:fontRef>
+    <cs:spPr>
+      <a:ln w="28575" cap="rnd">
+        <a:solidFill>
+          <a:schemeClr val="phClr"/>
+        </a:solidFill>
+        <a:round/>
+      </a:ln>
+    </cs:spPr>
+  </cs:dataPointLine>
+  <cs:dataPointMarker>
+    <cs:lnRef idx="0">
+      <cs:styleClr val="auto"/>
+    </cs:lnRef>
+    <cs:fillRef idx="1">
+      <cs:styleClr val="auto"/>
+    </cs:fillRef>
+    <cs:effectRef idx="0"/>
+    <cs:fontRef idx="minor">
+      <a:schemeClr val="tx1"/>
+    </cs:fontRef>
+    <cs:spPr>
+      <a:solidFill>
+        <a:schemeClr val="phClr"/>
+      </a:solidFill>
+      <a:ln w="9525">
+        <a:solidFill>
+          <a:schemeClr val="phClr"/>
+        </a:solidFill>
+      </a:ln>
+    </cs:spPr>
+  </cs:dataPointMarker>
+  <cs:dataPointMarkerLayout symbol="circle" size="5"/>
+  <cs:dataPointWireframe>
+    <cs:lnRef idx="0">
+      <cs:styleClr val="auto"/>
+    </cs:lnRef>
+    <cs:fillRef idx="1"/>
+    <cs:effectRef idx="0"/>
+    <cs:fontRef idx="minor">
+      <a:schemeClr val="tx1"/>
+    </cs:fontRef>
+    <cs:spPr>
+      <a:ln w="9525" cap="rnd">
+        <a:solidFill>
+          <a:schemeClr val="phClr"/>
+        </a:solidFill>
+        <a:round/>
+      </a:ln>
+    </cs:spPr>
+  </cs:dataPointWireframe>
+  <cs:dataTable>
+    <cs:lnRef idx="0"/>
+    <cs:fillRef idx="0"/>
+    <cs:effectRef idx="0"/>
+    <cs:fontRef idx="minor">
+      <a:schemeClr val="tx1">
+        <a:lumMod val="65000"/>
+        <a:lumOff val="35000"/>
+      </a:schemeClr>
+    </cs:fontRef>
+    <cs:spPr>
+      <a:noFill/>
+      <a:ln w="9525" cap="flat" cmpd="sng" algn="ctr">
+        <a:solidFill>
+          <a:schemeClr val="tx1">
+            <a:lumMod val="15000"/>
+            <a:lumOff val="85000"/>
+          </a:schemeClr>
+        </a:solidFill>
+        <a:round/>
+      </a:ln>
+    </cs:spPr>
+    <cs:defRPr sz="1197" kern="1200"/>
+  </cs:dataTable>
+  <cs:downBar>
+    <cs:lnRef idx="0"/>
+    <cs:fillRef idx="0"/>
+    <cs:effectRef idx="0"/>
+    <cs:fontRef idx="minor">
+      <a:schemeClr val="dk1"/>
+    </cs:fontRef>
+    <cs:spPr>
+      <a:solidFill>
+        <a:schemeClr val="dk1">
+          <a:lumMod val="65000"/>
+          <a:lumOff val="35000"/>
+        </a:schemeClr>
+      </a:solidFill>
+      <a:ln w="9525">
+        <a:solidFill>
+          <a:schemeClr val="tx1">
+            <a:lumMod val="65000"/>
+            <a:lumOff val="35000"/>
+          </a:schemeClr>
+        </a:solidFill>
+      </a:ln>
+    </cs:spPr>
+  </cs:downBar>
+  <cs:dropLine>
+    <cs:lnRef idx="0"/>
+    <cs:fillRef idx="0"/>
+    <cs:effectRef idx="0"/>
+    <cs:fontRef idx="minor">
+      <a:schemeClr val="tx1"/>
+    </cs:fontRef>
+    <cs:spPr>
+      <a:ln w="9525" cap="flat" cmpd="sng" algn="ctr">
+        <a:solidFill>
+          <a:schemeClr val="tx1">
+            <a:lumMod val="35000"/>
+            <a:lumOff val="65000"/>
+          </a:schemeClr>
+        </a:solidFill>
+        <a:round/>
+      </a:ln>
+    </cs:spPr>
+  </cs:dropLine>
+  <cs:errorBar>
+    <cs:lnRef idx="0"/>
+    <cs:fillRef idx="0"/>
+    <cs:effectRef idx="0"/>
+    <cs:fontRef idx="minor">
+      <a:schemeClr val="tx1"/>
+    </cs:fontRef>
+    <cs:spPr>
+      <a:ln w="9525" cap="flat" cmpd="sng" algn="ctr">
+        <a:solidFill>
+          <a:schemeClr val="tx1">
+            <a:lumMod val="65000"/>
+            <a:lumOff val="35000"/>
+          </a:schemeClr>
+        </a:solidFill>
+        <a:round/>
+      </a:ln>
+    </cs:spPr>
+  </cs:errorBar>
+  <cs:floor>
+    <cs:lnRef idx="0"/>
+    <cs:fillRef idx="0"/>
+    <cs:effectRef idx="0"/>
+    <cs:fontRef idx="minor">
+      <a:schemeClr val="tx1"/>
+    </cs:fontRef>
+    <cs:spPr>
+      <a:noFill/>
+      <a:ln>
+        <a:noFill/>
+      </a:ln>
+    </cs:spPr>
+  </cs:floor>
+  <cs:gridlineMajor>
+    <cs:lnRef idx="0"/>
+    <cs:fillRef idx="0"/>
+    <cs:effectRef idx="0"/>
+    <cs:fontRef idx="minor">
+      <a:schemeClr val="tx1"/>
+    </cs:fontRef>
+    <cs:spPr>
+      <a:ln w="9525" cap="flat" cmpd="sng" algn="ctr">
+        <a:solidFill>
+          <a:schemeClr val="tx1">
+            <a:lumMod val="15000"/>
+            <a:lumOff val="85000"/>
+          </a:schemeClr>
+        </a:solidFill>
+        <a:round/>
+      </a:ln>
+    </cs:spPr>
+  </cs:gridlineMajor>
+  <cs:gridlineMinor>
+    <cs:lnRef idx="0"/>
+    <cs:fillRef idx="0"/>
+    <cs:effectRef idx="0"/>
+    <cs:fontRef idx="minor">
+      <a:schemeClr val="tx1"/>
+    </cs:fontRef>
+    <cs:spPr>
+      <a:ln w="9525" cap="flat" cmpd="sng" algn="ctr">
+        <a:solidFill>
+          <a:schemeClr val="tx1">
+            <a:lumMod val="5000"/>
+            <a:lumOff val="95000"/>
+          </a:schemeClr>
+        </a:solidFill>
+        <a:round/>
+      </a:ln>
+    </cs:spPr>
+  </cs:gridlineMinor>
+  <cs:hiLoLine>
+    <cs:lnRef idx="0"/>
+    <cs:fillRef idx="0"/>
+    <cs:effectRef idx="0"/>
+    <cs:fontRef idx="minor">
+      <a:schemeClr val="tx1"/>
+    </cs:fontRef>
+    <cs:spPr>
+      <a:ln w="9525" cap="flat" cmpd="sng" algn="ctr">
+        <a:solidFill>
+          <a:schemeClr val="tx1">
+            <a:lumMod val="75000"/>
+            <a:lumOff val="25000"/>
+          </a:schemeClr>
+        </a:solidFill>
+        <a:round/>
+      </a:ln>
+    </cs:spPr>
+  </cs:hiLoLine>
+  <cs:leaderLine>
+    <cs:lnRef idx="0"/>
+    <cs:fillRef idx="0"/>
+    <cs:effectRef idx="0"/>
+    <cs:fontRef idx="minor">
+      <a:schemeClr val="tx1"/>
+    </cs:fontRef>
+    <cs:spPr>
+      <a:ln w="9525" cap="flat" cmpd="sng" algn="ctr">
+        <a:solidFill>
+          <a:schemeClr val="tx1">
+            <a:lumMod val="35000"/>
+            <a:lumOff val="65000"/>
+          </a:schemeClr>
+        </a:solidFill>
+        <a:round/>
+      </a:ln>
+    </cs:spPr>
+  </cs:leaderLine>
+  <cs:legend>
+    <cs:lnRef idx="0"/>
+    <cs:fillRef idx="0"/>
+    <cs:effectRef idx="0"/>
+    <cs:fontRef idx="minor">
+      <a:schemeClr val="tx1">
+        <a:lumMod val="65000"/>
+        <a:lumOff val="35000"/>
+      </a:schemeClr>
+    </cs:fontRef>
+    <cs:defRPr sz="1197" kern="1200"/>
+  </cs:legend>
+  <cs:plotArea mods="allowNoFillOverride allowNoLineOverride">
+    <cs:lnRef idx="0"/>
+    <cs:fillRef idx="0"/>
+    <cs:effectRef idx="0"/>
+    <cs:fontRef idx="minor">
+      <a:schemeClr val="tx1"/>
+    </cs:fontRef>
+  </cs:plotArea>
+  <cs:plotArea3D mods="allowNoFillOverride allowNoLineOverride">
+    <cs:lnRef idx="0"/>
+    <cs:fillRef idx="0"/>
+    <cs:effectRef idx="0"/>
+    <cs:fontRef idx="minor">
+      <a:schemeClr val="tx1"/>
+    </cs:fontRef>
+  </cs:plotArea3D>
+  <cs:seriesAxis>
+    <cs:lnRef idx="0"/>
+    <cs:fillRef idx="0"/>
+    <cs:effectRef idx="0"/>
+    <cs:fontRef idx="minor">
+      <a:schemeClr val="tx1">
+        <a:lumMod val="65000"/>
+        <a:lumOff val="35000"/>
+      </a:schemeClr>
+    </cs:fontRef>
+    <cs:defRPr sz="1197" kern="1200"/>
+  </cs:seriesAxis>
+  <cs:seriesLine>
+    <cs:lnRef idx="0"/>
+    <cs:fillRef idx="0"/>
+    <cs:effectRef idx="0"/>
+    <cs:fontRef idx="minor">
+      <a:schemeClr val="tx1"/>
+    </cs:fontRef>
+    <cs:spPr>
+      <a:ln w="9525" cap="flat" cmpd="sng" algn="ctr">
+        <a:solidFill>
+          <a:schemeClr val="tx1">
+            <a:lumMod val="35000"/>
+            <a:lumOff val="65000"/>
+          </a:schemeClr>
+        </a:solidFill>
+        <a:round/>
+      </a:ln>
+    </cs:spPr>
+  </cs:seriesLine>
+  <cs:title>
+    <cs:lnRef idx="0"/>
+    <cs:fillRef idx="0"/>
+    <cs:effectRef idx="0"/>
+    <cs:fontRef idx="minor">
+      <a:schemeClr val="tx1">
+        <a:lumMod val="65000"/>
+        <a:lumOff val="35000"/>
+      </a:schemeClr>
+    </cs:fontRef>
+    <cs:defRPr sz="1862" b="0" kern="1200" spc="0" baseline="0"/>
+  </cs:title>
+  <cs:trendline>
+    <cs:lnRef idx="0">
+      <cs:styleClr val="auto"/>
+    </cs:lnRef>
+    <cs:fillRef idx="0"/>
+    <cs:effectRef idx="0"/>
+    <cs:fontRef idx="minor">
+      <a:schemeClr val="tx1"/>
+    </cs:fontRef>
+    <cs:spPr>
+      <a:ln w="19050" cap="rnd">
+        <a:solidFill>
+          <a:schemeClr val="phClr"/>
+        </a:solidFill>
+        <a:prstDash val="sysDot"/>
+      </a:ln>
+    </cs:spPr>
+  </cs:trendline>
+  <cs:trendlineLabel>
+    <cs:lnRef idx="0"/>
+    <cs:fillRef idx="0"/>
+    <cs:effectRef idx="0"/>
+    <cs:fontRef idx="minor">
+      <a:schemeClr val="tx1">
+        <a:lumMod val="65000"/>
+        <a:lumOff val="35000"/>
+      </a:schemeClr>
+    </cs:fontRef>
+    <cs:defRPr sz="1197" kern="1200"/>
+  </cs:trendlineLabel>
+  <cs:upBar>
+    <cs:lnRef idx="0"/>
+    <cs:fillRef idx="0"/>
+    <cs:effectRef idx="0"/>
+    <cs:fontRef idx="minor">
+      <a:schemeClr val="dk1"/>
+    </cs:fontRef>
+    <cs:spPr>
+      <a:solidFill>
+        <a:schemeClr val="lt1"/>
+      </a:solidFill>
+      <a:ln w="9525">
+        <a:solidFill>
+          <a:schemeClr val="tx1">
+            <a:lumMod val="15000"/>
+            <a:lumOff val="85000"/>
+          </a:schemeClr>
+        </a:solidFill>
+      </a:ln>
+    </cs:spPr>
+  </cs:upBar>
+  <cs:valueAxis>
+    <cs:lnRef idx="0"/>
+    <cs:fillRef idx="0"/>
+    <cs:effectRef idx="0"/>
+    <cs:fontRef idx="minor">
+      <a:schemeClr val="tx1">
+        <a:lumMod val="65000"/>
+        <a:lumOff val="35000"/>
+      </a:schemeClr>
+    </cs:fontRef>
+    <cs:defRPr sz="1197" kern="1200"/>
+  </cs:valueAxis>
+  <cs:wall>
+    <cs:lnRef idx="0"/>
+    <cs:fillRef idx="0"/>
+    <cs:effectRef idx="0"/>
+    <cs:fontRef idx="minor">
+      <a:schemeClr val="tx1"/>
+    </cs:fontRef>
+    <cs:spPr>
+      <a:noFill/>
+      <a:ln>
+        <a:noFill/>
+      </a:ln>
+    </cs:spPr>
+  </cs:wall>
+</cs:chartStyle>
+</file>
+
+<file path=ppt/charts/style4.xml><?xml version="1.0" encoding="utf-8"?>
+<cs:chartStyle xmlns:cs="http://schemas.microsoft.com/office/drawing/2012/chartStyle" xmlns:a="http://schemas.openxmlformats.org/drawingml/2006/main" id="227">
+  <cs:axisTitle>
+    <cs:lnRef idx="0"/>
+    <cs:fillRef idx="0"/>
+    <cs:effectRef idx="0"/>
+    <cs:fontRef idx="minor">
+      <a:schemeClr val="tx1">
+        <a:lumMod val="65000"/>
+        <a:lumOff val="35000"/>
+      </a:schemeClr>
+    </cs:fontRef>
+    <cs:defRPr sz="1330" kern="1200"/>
+  </cs:axisTitle>
+  <cs:categoryAxis>
+    <cs:lnRef idx="0"/>
+    <cs:fillRef idx="0"/>
+    <cs:effectRef idx="0"/>
+    <cs:fontRef idx="minor">
+      <a:schemeClr val="tx1">
+        <a:lumMod val="65000"/>
+        <a:lumOff val="35000"/>
+      </a:schemeClr>
+    </cs:fontRef>
+    <cs:spPr>
+      <a:ln w="9525" cap="flat" cmpd="sng" algn="ctr">
+        <a:solidFill>
+          <a:schemeClr val="tx1">
+            <a:lumMod val="15000"/>
+            <a:lumOff val="85000"/>
+          </a:schemeClr>
+        </a:solidFill>
+        <a:round/>
+      </a:ln>
+    </cs:spPr>
+    <cs:defRPr sz="1197" kern="1200"/>
+  </cs:categoryAxis>
+  <cs:chartArea mods="allowNoFillOverride allowNoLineOverride">
+    <cs:lnRef idx="0"/>
+    <cs:fillRef idx="0"/>
+    <cs:effectRef idx="0"/>
+    <cs:fontRef idx="minor">
+      <a:schemeClr val="tx1"/>
+    </cs:fontRef>
+    <cs:spPr>
+      <a:solidFill>
+        <a:schemeClr val="bg1"/>
+      </a:solidFill>
+      <a:ln w="9525" cap="flat" cmpd="sng" algn="ctr">
+        <a:solidFill>
+          <a:schemeClr val="tx1">
+            <a:lumMod val="15000"/>
+            <a:lumOff val="85000"/>
+          </a:schemeClr>
+        </a:solidFill>
+        <a:round/>
+      </a:ln>
+    </cs:spPr>
+    <cs:defRPr sz="1330" kern="1200"/>
+  </cs:chartArea>
+  <cs:dataLabel>
+    <cs:lnRef idx="0"/>
+    <cs:fillRef idx="0"/>
+    <cs:effectRef idx="0"/>
+    <cs:fontRef idx="minor">
+      <a:schemeClr val="tx1">
+        <a:lumMod val="75000"/>
+        <a:lumOff val="25000"/>
+      </a:schemeClr>
+    </cs:fontRef>
+    <cs:defRPr sz="1197" kern="1200"/>
+  </cs:dataLabel>
+  <cs:dataLabelCallout>
+    <cs:lnRef idx="0"/>
+    <cs:fillRef idx="0"/>
+    <cs:effectRef idx="0"/>
+    <cs:fontRef idx="minor">
+      <a:schemeClr val="dk1">
+        <a:lumMod val="65000"/>
+        <a:lumOff val="35000"/>
+      </a:schemeClr>
+    </cs:fontRef>
+    <cs:spPr>
+      <a:solidFill>
+        <a:schemeClr val="lt1"/>
+      </a:solidFill>
+      <a:ln>
+        <a:solidFill>
+          <a:schemeClr val="dk1">
+            <a:lumMod val="25000"/>
+            <a:lumOff val="75000"/>
+          </a:schemeClr>
+        </a:solidFill>
+      </a:ln>
+    </cs:spPr>
+    <cs:defRPr sz="1197" kern="1200"/>
+    <cs:bodyPr rot="0" spcFirstLastPara="1" vertOverflow="clip" horzOverflow="clip" vert="horz" wrap="square" lIns="36576" tIns="18288" rIns="36576" bIns="18288" anchor="ctr" anchorCtr="1">
+      <a:spAutoFit/>
+    </cs:bodyPr>
+  </cs:dataLabelCallout>
+  <cs:dataPoint>
+    <cs:lnRef idx="0"/>
+    <cs:fillRef idx="1">
+      <cs:styleClr val="auto"/>
+    </cs:fillRef>
+    <cs:effectRef idx="0"/>
+    <cs:fontRef idx="minor">
+      <a:schemeClr val="tx1"/>
+    </cs:fontRef>
+    <cs:spPr>
+      <a:solidFill>
+        <a:schemeClr val="phClr"/>
+      </a:solidFill>
+    </cs:spPr>
+  </cs:dataPoint>
+  <cs:dataPoint3D>
+    <cs:lnRef idx="0"/>
+    <cs:fillRef idx="1">
+      <cs:styleClr val="auto"/>
+    </cs:fillRef>
+    <cs:effectRef idx="0"/>
+    <cs:fontRef idx="minor">
+      <a:schemeClr val="tx1"/>
+    </cs:fontRef>
+    <cs:spPr>
+      <a:solidFill>
+        <a:schemeClr val="phClr"/>
+      </a:solidFill>
+    </cs:spPr>
+  </cs:dataPoint3D>
+  <cs:dataPointLine>
+    <cs:lnRef idx="0">
+      <cs:styleClr val="auto"/>
+    </cs:lnRef>
+    <cs:fillRef idx="1"/>
+    <cs:effectRef idx="0"/>
+    <cs:fontRef idx="minor">
+      <a:schemeClr val="tx1"/>
+    </cs:fontRef>
+    <cs:spPr>
+      <a:ln w="28575" cap="rnd">
+        <a:solidFill>
+          <a:schemeClr val="phClr"/>
+        </a:solidFill>
+        <a:round/>
+      </a:ln>
+    </cs:spPr>
+  </cs:dataPointLine>
+  <cs:dataPointMarker>
+    <cs:lnRef idx="0">
+      <cs:styleClr val="auto"/>
+    </cs:lnRef>
+    <cs:fillRef idx="1">
+      <cs:styleClr val="auto"/>
+    </cs:fillRef>
+    <cs:effectRef idx="0"/>
+    <cs:fontRef idx="minor">
+      <a:schemeClr val="tx1"/>
+    </cs:fontRef>
+    <cs:spPr>
+      <a:solidFill>
+        <a:schemeClr val="phClr"/>
+      </a:solidFill>
+      <a:ln w="9525">
+        <a:solidFill>
+          <a:schemeClr val="phClr"/>
+        </a:solidFill>
+      </a:ln>
+    </cs:spPr>
+  </cs:dataPointMarker>
+  <cs:dataPointMarkerLayout symbol="circle" size="5"/>
+  <cs:dataPointWireframe>
+    <cs:lnRef idx="0">
+      <cs:styleClr val="auto"/>
+    </cs:lnRef>
+    <cs:fillRef idx="1"/>
+    <cs:effectRef idx="0"/>
+    <cs:fontRef idx="minor">
+      <a:schemeClr val="tx1"/>
+    </cs:fontRef>
+    <cs:spPr>
+      <a:ln w="9525" cap="rnd">
+        <a:solidFill>
+          <a:schemeClr val="phClr"/>
+        </a:solidFill>
+        <a:round/>
+      </a:ln>
+    </cs:spPr>
+  </cs:dataPointWireframe>
+  <cs:dataTable>
+    <cs:lnRef idx="0"/>
+    <cs:fillRef idx="0"/>
+    <cs:effectRef idx="0"/>
+    <cs:fontRef idx="minor">
+      <a:schemeClr val="tx1">
+        <a:lumMod val="65000"/>
+        <a:lumOff val="35000"/>
+      </a:schemeClr>
+    </cs:fontRef>
+    <cs:spPr>
+      <a:noFill/>
+      <a:ln w="9525" cap="flat" cmpd="sng" algn="ctr">
+        <a:solidFill>
+          <a:schemeClr val="tx1">
+            <a:lumMod val="15000"/>
+            <a:lumOff val="85000"/>
+          </a:schemeClr>
+        </a:solidFill>
+        <a:round/>
+      </a:ln>
+    </cs:spPr>
+    <cs:defRPr sz="1197" kern="1200"/>
+  </cs:dataTable>
+  <cs:downBar>
+    <cs:lnRef idx="0"/>
+    <cs:fillRef idx="0"/>
+    <cs:effectRef idx="0"/>
+    <cs:fontRef idx="minor">
+      <a:schemeClr val="dk1"/>
+    </cs:fontRef>
+    <cs:spPr>
+      <a:solidFill>
+        <a:schemeClr val="dk1">
+          <a:lumMod val="65000"/>
+          <a:lumOff val="35000"/>
+        </a:schemeClr>
+      </a:solidFill>
+      <a:ln w="9525">
+        <a:solidFill>
+          <a:schemeClr val="tx1">
+            <a:lumMod val="65000"/>
+            <a:lumOff val="35000"/>
+          </a:schemeClr>
+        </a:solidFill>
+      </a:ln>
+    </cs:spPr>
+  </cs:downBar>
+  <cs:dropLine>
+    <cs:lnRef idx="0"/>
+    <cs:fillRef idx="0"/>
+    <cs:effectRef idx="0"/>
+    <cs:fontRef idx="minor">
+      <a:schemeClr val="tx1"/>
+    </cs:fontRef>
+    <cs:spPr>
+      <a:ln w="9525" cap="flat" cmpd="sng" algn="ctr">
+        <a:solidFill>
+          <a:schemeClr val="tx1">
+            <a:lumMod val="35000"/>
+            <a:lumOff val="65000"/>
+          </a:schemeClr>
+        </a:solidFill>
+        <a:round/>
+      </a:ln>
+    </cs:spPr>
+  </cs:dropLine>
+  <cs:errorBar>
+    <cs:lnRef idx="0"/>
+    <cs:fillRef idx="0"/>
+    <cs:effectRef idx="0"/>
+    <cs:fontRef idx="minor">
+      <a:schemeClr val="tx1"/>
+    </cs:fontRef>
+    <cs:spPr>
+      <a:ln w="9525" cap="flat" cmpd="sng" algn="ctr">
+        <a:solidFill>
+          <a:schemeClr val="tx1">
+            <a:lumMod val="65000"/>
+            <a:lumOff val="35000"/>
+          </a:schemeClr>
+        </a:solidFill>
+        <a:round/>
+      </a:ln>
+    </cs:spPr>
+  </cs:errorBar>
+  <cs:floor>
+    <cs:lnRef idx="0"/>
+    <cs:fillRef idx="0"/>
+    <cs:effectRef idx="0"/>
+    <cs:fontRef idx="minor">
+      <a:schemeClr val="tx1"/>
+    </cs:fontRef>
+    <cs:spPr>
+      <a:noFill/>
+      <a:ln>
+        <a:noFill/>
+      </a:ln>
+    </cs:spPr>
+  </cs:floor>
+  <cs:gridlineMajor>
+    <cs:lnRef idx="0"/>
+    <cs:fillRef idx="0"/>
+    <cs:effectRef idx="0"/>
+    <cs:fontRef idx="minor">
+      <a:schemeClr val="tx1"/>
+    </cs:fontRef>
+    <cs:spPr>
+      <a:ln w="9525" cap="flat" cmpd="sng" algn="ctr">
+        <a:solidFill>
+          <a:schemeClr val="tx1">
+            <a:lumMod val="15000"/>
+            <a:lumOff val="85000"/>
+          </a:schemeClr>
+        </a:solidFill>
+        <a:round/>
+      </a:ln>
+    </cs:spPr>
+  </cs:gridlineMajor>
+  <cs:gridlineMinor>
+    <cs:lnRef idx="0"/>
+    <cs:fillRef idx="0"/>
+    <cs:effectRef idx="0"/>
+    <cs:fontRef idx="minor">
+      <a:schemeClr val="tx1"/>
+    </cs:fontRef>
+    <cs:spPr>
+      <a:ln w="9525" cap="flat" cmpd="sng" algn="ctr">
+        <a:solidFill>
+          <a:schemeClr val="tx1">
+            <a:lumMod val="5000"/>
+            <a:lumOff val="95000"/>
+          </a:schemeClr>
+        </a:solidFill>
+        <a:round/>
+      </a:ln>
+    </cs:spPr>
+  </cs:gridlineMinor>
+  <cs:hiLoLine>
+    <cs:lnRef idx="0"/>
+    <cs:fillRef idx="0"/>
+    <cs:effectRef idx="0"/>
+    <cs:fontRef idx="minor">
+      <a:schemeClr val="tx1"/>
+    </cs:fontRef>
+    <cs:spPr>
+      <a:ln w="9525" cap="flat" cmpd="sng" algn="ctr">
+        <a:solidFill>
+          <a:schemeClr val="tx1">
+            <a:lumMod val="75000"/>
+            <a:lumOff val="25000"/>
+          </a:schemeClr>
+        </a:solidFill>
+        <a:round/>
+      </a:ln>
+    </cs:spPr>
+  </cs:hiLoLine>
+  <cs:leaderLine>
+    <cs:lnRef idx="0"/>
+    <cs:fillRef idx="0"/>
+    <cs:effectRef idx="0"/>
+    <cs:fontRef idx="minor">
+      <a:schemeClr val="tx1"/>
+    </cs:fontRef>
+    <cs:spPr>
+      <a:ln w="9525" cap="flat" cmpd="sng" algn="ctr">
+        <a:solidFill>
+          <a:schemeClr val="tx1">
+            <a:lumMod val="35000"/>
+            <a:lumOff val="65000"/>
+          </a:schemeClr>
+        </a:solidFill>
+        <a:round/>
+      </a:ln>
+    </cs:spPr>
+  </cs:leaderLine>
+  <cs:legend>
+    <cs:lnRef idx="0"/>
+    <cs:fillRef idx="0"/>
+    <cs:effectRef idx="0"/>
+    <cs:fontRef idx="minor">
+      <a:schemeClr val="tx1">
+        <a:lumMod val="65000"/>
+        <a:lumOff val="35000"/>
+      </a:schemeClr>
+    </cs:fontRef>
+    <cs:defRPr sz="1197" kern="1200"/>
+  </cs:legend>
+  <cs:plotArea mods="allowNoFillOverride allowNoLineOverride">
+    <cs:lnRef idx="0"/>
+    <cs:fillRef idx="0"/>
+    <cs:effectRef idx="0"/>
+    <cs:fontRef idx="minor">
+      <a:schemeClr val="tx1"/>
+    </cs:fontRef>
+  </cs:plotArea>
+  <cs:plotArea3D mods="allowNoFillOverride allowNoLineOverride">
+    <cs:lnRef idx="0"/>
+    <cs:fillRef idx="0"/>
+    <cs:effectRef idx="0"/>
+    <cs:fontRef idx="minor">
+      <a:schemeClr val="tx1"/>
+    </cs:fontRef>
+  </cs:plotArea3D>
+  <cs:seriesAxis>
+    <cs:lnRef idx="0"/>
+    <cs:fillRef idx="0"/>
+    <cs:effectRef idx="0"/>
+    <cs:fontRef idx="minor">
+      <a:schemeClr val="tx1">
+        <a:lumMod val="65000"/>
+        <a:lumOff val="35000"/>
+      </a:schemeClr>
+    </cs:fontRef>
+    <cs:defRPr sz="1197" kern="1200"/>
+  </cs:seriesAxis>
+  <cs:seriesLine>
+    <cs:lnRef idx="0"/>
+    <cs:fillRef idx="0"/>
+    <cs:effectRef idx="0"/>
+    <cs:fontRef idx="minor">
+      <a:schemeClr val="tx1"/>
+    </cs:fontRef>
+    <cs:spPr>
+      <a:ln w="9525" cap="flat" cmpd="sng" algn="ctr">
+        <a:solidFill>
+          <a:schemeClr val="tx1">
+            <a:lumMod val="35000"/>
+            <a:lumOff val="65000"/>
+          </a:schemeClr>
+        </a:solidFill>
+        <a:round/>
+      </a:ln>
+    </cs:spPr>
+  </cs:seriesLine>
+  <cs:title>
+    <cs:lnRef idx="0"/>
+    <cs:fillRef idx="0"/>
+    <cs:effectRef idx="0"/>
+    <cs:fontRef idx="minor">
+      <a:schemeClr val="tx1">
+        <a:lumMod val="65000"/>
+        <a:lumOff val="35000"/>
+      </a:schemeClr>
+    </cs:fontRef>
+    <cs:defRPr sz="1862" b="0" kern="1200" spc="0" baseline="0"/>
+  </cs:title>
+  <cs:trendline>
+    <cs:lnRef idx="0">
+      <cs:styleClr val="auto"/>
+    </cs:lnRef>
+    <cs:fillRef idx="0"/>
+    <cs:effectRef idx="0"/>
+    <cs:fontRef idx="minor">
+      <a:schemeClr val="tx1"/>
+    </cs:fontRef>
+    <cs:spPr>
+      <a:ln w="19050" cap="rnd">
+        <a:solidFill>
+          <a:schemeClr val="phClr"/>
+        </a:solidFill>
+        <a:prstDash val="sysDot"/>
+      </a:ln>
+    </cs:spPr>
+  </cs:trendline>
+  <cs:trendlineLabel>
+    <cs:lnRef idx="0"/>
+    <cs:fillRef idx="0"/>
+    <cs:effectRef idx="0"/>
+    <cs:fontRef idx="minor">
+      <a:schemeClr val="tx1">
+        <a:lumMod val="65000"/>
+        <a:lumOff val="35000"/>
+      </a:schemeClr>
+    </cs:fontRef>
+    <cs:defRPr sz="1197" kern="1200"/>
+  </cs:trendlineLabel>
+  <cs:upBar>
+    <cs:lnRef idx="0"/>
+    <cs:fillRef idx="0"/>
+    <cs:effectRef idx="0"/>
+    <cs:fontRef idx="minor">
+      <a:schemeClr val="dk1"/>
+    </cs:fontRef>
+    <cs:spPr>
+      <a:solidFill>
+        <a:schemeClr val="lt1"/>
+      </a:solidFill>
+      <a:ln w="9525">
+        <a:solidFill>
+          <a:schemeClr val="tx1">
+            <a:lumMod val="15000"/>
+            <a:lumOff val="85000"/>
+          </a:schemeClr>
+        </a:solidFill>
+      </a:ln>
+    </cs:spPr>
+  </cs:upBar>
+  <cs:valueAxis>
+    <cs:lnRef idx="0"/>
+    <cs:fillRef idx="0"/>
+    <cs:effectRef idx="0"/>
+    <cs:fontRef idx="minor">
+      <a:schemeClr val="tx1">
+        <a:lumMod val="65000"/>
+        <a:lumOff val="35000"/>
+      </a:schemeClr>
+    </cs:fontRef>
+    <cs:defRPr sz="1197" kern="1200"/>
+  </cs:valueAxis>
+  <cs:wall>
+    <cs:lnRef idx="0"/>
+    <cs:fillRef idx="0"/>
+    <cs:effectRef idx="0"/>
+    <cs:fontRef idx="minor">
+      <a:schemeClr val="tx1"/>
+    </cs:fontRef>
+    <cs:spPr>
+      <a:noFill/>
+      <a:ln>
+        <a:noFill/>
+      </a:ln>
+    </cs:spPr>
+  </cs:wall>
+</cs:chartStyle>
+</file>
+
 <file path=ppt/comments/comment1.xml><?xml version="1.0" encoding="utf-8"?>
 <p:cmLst xmlns:a="http://schemas.openxmlformats.org/drawingml/2006/main" xmlns:r="http://schemas.openxmlformats.org/officeDocument/2006/relationships" xmlns:p="http://schemas.openxmlformats.org/presentationml/2006/main">
   <p:cm authorId="1" dt="2020-05-06T16:42:27.923" idx="1">
@@ -2451,7 +4445,7 @@
             <a:fld id="{08B9EBBA-996F-894A-B54A-D6246ED52CEA}" type="datetimeFigureOut">
               <a:rPr lang="en-US" dirty="0"/>
               <a:pPr/>
-              <a:t>06-May-20</a:t>
+              <a:t>07-May-20</a:t>
             </a:fld>
             <a:endParaRPr lang="en-US" dirty="0"/>
           </a:p>
@@ -2766,7 +4760,7 @@
             <a:fld id="{18C79C5D-2A6F-F04D-97DA-BEF2467B64E4}" type="datetimeFigureOut">
               <a:rPr lang="en-US" dirty="0"/>
               <a:pPr/>
-              <a:t>06-May-20</a:t>
+              <a:t>07-May-20</a:t>
             </a:fld>
             <a:endParaRPr lang="en-US" dirty="0"/>
           </a:p>
@@ -3251,7 +5245,7 @@
             <a:fld id="{8DFA1846-DA80-1C48-A609-854EA85C59AD}" type="datetimeFigureOut">
               <a:rPr lang="en-US" dirty="0"/>
               <a:pPr/>
-              <a:t>06-May-20</a:t>
+              <a:t>07-May-20</a:t>
             </a:fld>
             <a:endParaRPr lang="en-US" dirty="0"/>
           </a:p>
@@ -3617,7 +5611,7 @@
             <a:fld id="{FBF54567-0DE4-3F47-BF90-CB84690072F9}" type="datetimeFigureOut">
               <a:rPr lang="en-US" dirty="0"/>
               <a:pPr/>
-              <a:t>06-May-20</a:t>
+              <a:t>07-May-20</a:t>
             </a:fld>
             <a:endParaRPr lang="en-US" dirty="0"/>
           </a:p>
@@ -3887,7 +5881,7 @@
             <a:fld id="{C6C52C72-DE31-F449-A4ED-4C594FD91407}" type="datetimeFigureOut">
               <a:rPr lang="en-US" dirty="0"/>
               <a:pPr/>
-              <a:t>06-May-20</a:t>
+              <a:t>07-May-20</a:t>
             </a:fld>
             <a:endParaRPr lang="en-US" dirty="0"/>
           </a:p>
@@ -4169,7 +6163,7 @@
             <a:fld id="{ED62726E-379B-B349-9EED-81ED093FA806}" type="datetimeFigureOut">
               <a:rPr lang="en-US" dirty="0"/>
               <a:pPr/>
-              <a:t>06-May-20</a:t>
+              <a:t>07-May-20</a:t>
             </a:fld>
             <a:endParaRPr lang="en-US" dirty="0"/>
           </a:p>
@@ -4449,7 +6443,7 @@
             <a:fld id="{9B3A1323-8D79-1946-B0D7-40001CF92E9D}" type="datetimeFigureOut">
               <a:rPr lang="en-US" dirty="0"/>
               <a:pPr/>
-              <a:t>06-May-20</a:t>
+              <a:t>07-May-20</a:t>
             </a:fld>
             <a:endParaRPr lang="en-US" dirty="0"/>
           </a:p>
@@ -4789,7 +6783,7 @@
             <a:fld id="{8DFA1846-DA80-1C48-A609-854EA85C59AD}" type="datetimeFigureOut">
               <a:rPr lang="en-US" dirty="0"/>
               <a:pPr/>
-              <a:t>06-May-20</a:t>
+              <a:t>07-May-20</a:t>
             </a:fld>
             <a:endParaRPr lang="en-US" dirty="0"/>
           </a:p>
@@ -5125,7 +7119,7 @@
             <a:fld id="{57302355-E14B-8545-A8F8-0FE83CC9D524}" type="datetimeFigureOut">
               <a:rPr lang="en-US" dirty="0"/>
               <a:pPr/>
-              <a:t>06-May-20</a:t>
+              <a:t>07-May-20</a:t>
             </a:fld>
             <a:endParaRPr lang="en-US" dirty="0"/>
           </a:p>
@@ -5599,7 +7593,7 @@
             <a:fld id="{02640F58-564D-2B4F-AE67-E407BA4FCF45}" type="datetimeFigureOut">
               <a:rPr lang="en-US" dirty="0"/>
               <a:pPr/>
-              <a:t>06-May-20</a:t>
+              <a:t>07-May-20</a:t>
             </a:fld>
             <a:endParaRPr lang="en-US" dirty="0"/>
           </a:p>
@@ -5817,7 +7811,7 @@
             <a:fld id="{F13A34C8-038E-2045-AF43-DF7DBB8E0E9E}" type="datetimeFigureOut">
               <a:rPr lang="en-US" dirty="0"/>
               <a:pPr/>
-              <a:t>06-May-20</a:t>
+              <a:t>07-May-20</a:t>
             </a:fld>
             <a:endParaRPr lang="en-US" dirty="0"/>
           </a:p>
@@ -5909,7 +7903,7 @@
             <a:fld id="{8818C68F-D26B-8F47-958C-23B49CF8A634}" type="datetimeFigureOut">
               <a:rPr lang="en-US" dirty="0"/>
               <a:pPr/>
-              <a:t>06-May-20</a:t>
+              <a:t>07-May-20</a:t>
             </a:fld>
             <a:endParaRPr lang="en-US" dirty="0"/>
           </a:p>
@@ -6373,7 +8367,7 @@
             <a:fld id="{D0DF5E60-9974-AC48-9591-99C2BB44B7CF}" type="datetimeFigureOut">
               <a:rPr lang="en-US" dirty="0"/>
               <a:pPr/>
-              <a:t>06-May-20</a:t>
+              <a:t>07-May-20</a:t>
             </a:fld>
             <a:endParaRPr lang="en-US" dirty="0"/>
           </a:p>
@@ -6683,7 +8677,7 @@
             <a:fld id="{18C79C5D-2A6F-F04D-97DA-BEF2467B64E4}" type="datetimeFigureOut">
               <a:rPr lang="en-US" dirty="0"/>
               <a:pPr/>
-              <a:t>06-May-20</a:t>
+              <a:t>07-May-20</a:t>
             </a:fld>
             <a:endParaRPr lang="en-US" dirty="0"/>
           </a:p>
@@ -6950,7 +8944,7 @@
             <a:fld id="{09B482E8-6E0E-1B4F-B1FD-C69DB9E858D9}" type="datetimeFigureOut">
               <a:rPr lang="en-US" dirty="0"/>
               <a:pPr/>
-              <a:t>06-May-20</a:t>
+              <a:t>07-May-20</a:t>
             </a:fld>
             <a:endParaRPr lang="en-US" dirty="0"/>
           </a:p>
@@ -7726,7 +9720,7 @@
           <p:nvPr>
             <p:extLst>
               <p:ext uri="{D42A27DB-BD31-4B8C-83A1-F6EECF244321}">
-                <p14:modId xmlns:p14="http://schemas.microsoft.com/office/powerpoint/2010/main" val="288727015"/>
+                <p14:modId xmlns:p14="http://schemas.microsoft.com/office/powerpoint/2010/main" val="2293393457"/>
               </p:ext>
             </p:extLst>
           </p:nvPr>
@@ -9068,7 +11062,7 @@
         </p:nvSpPr>
         <p:spPr>
           <a:xfrm>
-            <a:off x="810000" y="447188"/>
+            <a:off x="955873" y="537662"/>
             <a:ext cx="10571998" cy="970450"/>
           </a:xfrm>
         </p:spPr>
@@ -11171,6 +13165,466 @@
 </p:sld>
 </file>
 
+<file path=ppt/slides/slide17.xml><?xml version="1.0" encoding="utf-8"?>
+<p:sld xmlns:a="http://schemas.openxmlformats.org/drawingml/2006/main" xmlns:r="http://schemas.openxmlformats.org/officeDocument/2006/relationships" xmlns:p="http://schemas.openxmlformats.org/presentationml/2006/main">
+  <p:cSld>
+    <p:spTree>
+      <p:nvGrpSpPr>
+        <p:cNvPr id="1" name=""/>
+        <p:cNvGrpSpPr/>
+        <p:nvPr/>
+      </p:nvGrpSpPr>
+      <p:grpSpPr>
+        <a:xfrm>
+          <a:off x="0" y="0"/>
+          <a:ext cx="0" cy="0"/>
+          <a:chOff x="0" y="0"/>
+          <a:chExt cx="0" cy="0"/>
+        </a:xfrm>
+      </p:grpSpPr>
+      <p:sp>
+        <p:nvSpPr>
+          <p:cNvPr id="2" name="Título 1">
+            <a:extLst>
+              <a:ext uri="{FF2B5EF4-FFF2-40B4-BE49-F238E27FC236}">
+                <a16:creationId xmlns:a16="http://schemas.microsoft.com/office/drawing/2014/main" id="{D161ECB1-21B6-4793-8B64-B360800593C7}"/>
+              </a:ext>
+            </a:extLst>
+          </p:cNvPr>
+          <p:cNvSpPr>
+            <a:spLocks noGrp="1"/>
+          </p:cNvSpPr>
+          <p:nvPr>
+            <p:ph type="title"/>
+          </p:nvPr>
+        </p:nvSpPr>
+        <p:spPr/>
+        <p:txBody>
+          <a:bodyPr/>
+          <a:lstStyle/>
+          <a:p>
+            <a:r>
+              <a:rPr lang="en-US" dirty="0" err="1"/>
+              <a:t>Desenvolvimento</a:t>
+            </a:r>
+            <a:r>
+              <a:rPr lang="en-US" dirty="0"/>
+              <a:t> de </a:t>
+            </a:r>
+            <a:r>
+              <a:rPr lang="en-US" dirty="0" err="1"/>
+              <a:t>aplicações</a:t>
+            </a:r>
+            <a:endParaRPr lang="pt-PT" dirty="0"/>
+          </a:p>
+        </p:txBody>
+      </p:sp>
+      <p:pic>
+        <p:nvPicPr>
+          <p:cNvPr id="7" name="Marcador de Posição de Conteúdo 6" descr="Uma imagem com texto, mapa, interior, computador&#10;&#10;Descrição gerada automaticamente">
+            <a:extLst>
+              <a:ext uri="{FF2B5EF4-FFF2-40B4-BE49-F238E27FC236}">
+                <a16:creationId xmlns:a16="http://schemas.microsoft.com/office/drawing/2014/main" id="{10C2EE8C-1231-4EB4-B915-FFB381952E27}"/>
+              </a:ext>
+            </a:extLst>
+          </p:cNvPr>
+          <p:cNvPicPr>
+            <a:picLocks noGrp="1" noChangeAspect="1"/>
+          </p:cNvPicPr>
+          <p:nvPr>
+            <p:ph idx="1"/>
+          </p:nvPr>
+        </p:nvPicPr>
+        <p:blipFill>
+          <a:blip r:embed="rId2"/>
+          <a:stretch>
+            <a:fillRect/>
+          </a:stretch>
+        </p:blipFill>
+        <p:spPr>
+          <a:xfrm>
+            <a:off x="2588455" y="1941342"/>
+            <a:ext cx="6766560" cy="4916658"/>
+          </a:xfrm>
+        </p:spPr>
+      </p:pic>
+      <p:sp>
+        <p:nvSpPr>
+          <p:cNvPr id="5" name="CaixaDeTexto 4">
+            <a:extLst>
+              <a:ext uri="{FF2B5EF4-FFF2-40B4-BE49-F238E27FC236}">
+                <a16:creationId xmlns:a16="http://schemas.microsoft.com/office/drawing/2014/main" id="{4D596ED7-2D71-46F4-A054-AB524F6ACAFC}"/>
+              </a:ext>
+            </a:extLst>
+          </p:cNvPr>
+          <p:cNvSpPr txBox="1"/>
+          <p:nvPr/>
+        </p:nvSpPr>
+        <p:spPr>
+          <a:xfrm>
+            <a:off x="4393094" y="1417638"/>
+            <a:ext cx="3405809" cy="369332"/>
+          </a:xfrm>
+          <a:prstGeom prst="rect">
+            <a:avLst/>
+          </a:prstGeom>
+          <a:noFill/>
+        </p:spPr>
+        <p:txBody>
+          <a:bodyPr wrap="square" rtlCol="0">
+            <a:spAutoFit/>
+          </a:bodyPr>
+          <a:lstStyle/>
+          <a:p>
+            <a:pPr algn="ctr"/>
+            <a:r>
+              <a:rPr lang="pt-PT" dirty="0"/>
+              <a:t>Diagrama de  classes</a:t>
+            </a:r>
+          </a:p>
+        </p:txBody>
+      </p:sp>
+    </p:spTree>
+    <p:extLst>
+      <p:ext uri="{BB962C8B-B14F-4D97-AF65-F5344CB8AC3E}">
+        <p14:creationId xmlns:p14="http://schemas.microsoft.com/office/powerpoint/2010/main" val="1877602310"/>
+      </p:ext>
+    </p:extLst>
+  </p:cSld>
+  <p:clrMapOvr>
+    <a:masterClrMapping/>
+  </p:clrMapOvr>
+</p:sld>
+</file>
+
+<file path=ppt/slides/slide18.xml><?xml version="1.0" encoding="utf-8"?>
+<p:sld xmlns:a="http://schemas.openxmlformats.org/drawingml/2006/main" xmlns:r="http://schemas.openxmlformats.org/officeDocument/2006/relationships" xmlns:p="http://schemas.openxmlformats.org/presentationml/2006/main">
+  <p:cSld>
+    <p:spTree>
+      <p:nvGrpSpPr>
+        <p:cNvPr id="1" name=""/>
+        <p:cNvGrpSpPr/>
+        <p:nvPr/>
+      </p:nvGrpSpPr>
+      <p:grpSpPr>
+        <a:xfrm>
+          <a:off x="0" y="0"/>
+          <a:ext cx="0" cy="0"/>
+          <a:chOff x="0" y="0"/>
+          <a:chExt cx="0" cy="0"/>
+        </a:xfrm>
+      </p:grpSpPr>
+      <p:sp>
+        <p:nvSpPr>
+          <p:cNvPr id="2" name="Título 1">
+            <a:extLst>
+              <a:ext uri="{FF2B5EF4-FFF2-40B4-BE49-F238E27FC236}">
+                <a16:creationId xmlns:a16="http://schemas.microsoft.com/office/drawing/2014/main" id="{759918A3-2983-4E78-A8D7-4AD95D7872F7}"/>
+              </a:ext>
+            </a:extLst>
+          </p:cNvPr>
+          <p:cNvSpPr>
+            <a:spLocks noGrp="1"/>
+          </p:cNvSpPr>
+          <p:nvPr>
+            <p:ph type="title"/>
+          </p:nvPr>
+        </p:nvSpPr>
+        <p:spPr/>
+        <p:txBody>
+          <a:bodyPr/>
+          <a:lstStyle/>
+          <a:p>
+            <a:r>
+              <a:rPr lang="en-US" dirty="0" err="1"/>
+              <a:t>Desenvolvimento</a:t>
+            </a:r>
+            <a:r>
+              <a:rPr lang="en-US" dirty="0"/>
+              <a:t> de </a:t>
+            </a:r>
+            <a:r>
+              <a:rPr lang="en-US" dirty="0" err="1"/>
+              <a:t>aplicações</a:t>
+            </a:r>
+            <a:endParaRPr lang="pt-PT" dirty="0"/>
+          </a:p>
+        </p:txBody>
+      </p:sp>
+      <p:sp>
+        <p:nvSpPr>
+          <p:cNvPr id="5" name="CaixaDeTexto 4">
+            <a:extLst>
+              <a:ext uri="{FF2B5EF4-FFF2-40B4-BE49-F238E27FC236}">
+                <a16:creationId xmlns:a16="http://schemas.microsoft.com/office/drawing/2014/main" id="{C2C9CCAB-6B4C-4960-8A36-A913C1684405}"/>
+              </a:ext>
+            </a:extLst>
+          </p:cNvPr>
+          <p:cNvSpPr txBox="1"/>
+          <p:nvPr/>
+        </p:nvSpPr>
+        <p:spPr>
+          <a:xfrm>
+            <a:off x="4473526" y="1431706"/>
+            <a:ext cx="2574388" cy="369332"/>
+          </a:xfrm>
+          <a:prstGeom prst="rect">
+            <a:avLst/>
+          </a:prstGeom>
+          <a:noFill/>
+        </p:spPr>
+        <p:txBody>
+          <a:bodyPr wrap="square" rtlCol="0">
+            <a:spAutoFit/>
+          </a:bodyPr>
+          <a:lstStyle/>
+          <a:p>
+            <a:pPr algn="ctr"/>
+            <a:r>
+              <a:rPr lang="pt-PT" dirty="0"/>
+              <a:t>Sprints 1</a:t>
+            </a:r>
+          </a:p>
+        </p:txBody>
+      </p:sp>
+      <p:graphicFrame>
+        <p:nvGraphicFramePr>
+          <p:cNvPr id="6" name="Marcador de Posição de Conteúdo 5">
+            <a:extLst>
+              <a:ext uri="{FF2B5EF4-FFF2-40B4-BE49-F238E27FC236}">
+                <a16:creationId xmlns:a16="http://schemas.microsoft.com/office/drawing/2014/main" id="{1C08D220-B320-4B02-852B-376D09D00493}"/>
+              </a:ext>
+            </a:extLst>
+          </p:cNvPr>
+          <p:cNvGraphicFramePr>
+            <a:graphicFrameLocks noGrp="1"/>
+          </p:cNvGraphicFramePr>
+          <p:nvPr>
+            <p:ph idx="1"/>
+            <p:extLst>
+              <p:ext uri="{D42A27DB-BD31-4B8C-83A1-F6EECF244321}">
+                <p14:modId xmlns:p14="http://schemas.microsoft.com/office/powerpoint/2010/main" val="3154811782"/>
+              </p:ext>
+            </p:extLst>
+          </p:nvPr>
+        </p:nvGraphicFramePr>
+        <p:xfrm>
+          <a:off x="7580242" y="2222500"/>
+          <a:ext cx="4081671" cy="3636963"/>
+        </p:xfrm>
+        <a:graphic>
+          <a:graphicData uri="http://schemas.openxmlformats.org/drawingml/2006/chart">
+            <c:chart xmlns:c="http://schemas.openxmlformats.org/drawingml/2006/chart" xmlns:r="http://schemas.openxmlformats.org/officeDocument/2006/relationships" r:id="rId2"/>
+          </a:graphicData>
+        </a:graphic>
+      </p:graphicFrame>
+      <p:pic>
+        <p:nvPicPr>
+          <p:cNvPr id="9" name="Imagem 8" descr="Uma imagem com captura de ecrã&#10;&#10;Descrição gerada automaticamente">
+            <a:extLst>
+              <a:ext uri="{FF2B5EF4-FFF2-40B4-BE49-F238E27FC236}">
+                <a16:creationId xmlns:a16="http://schemas.microsoft.com/office/drawing/2014/main" id="{80EBCC5D-B4E2-4153-A8E5-B0295D2820C4}"/>
+              </a:ext>
+            </a:extLst>
+          </p:cNvPr>
+          <p:cNvPicPr>
+            <a:picLocks noChangeAspect="1"/>
+          </p:cNvPicPr>
+          <p:nvPr/>
+        </p:nvPicPr>
+        <p:blipFill>
+          <a:blip r:embed="rId3"/>
+          <a:stretch>
+            <a:fillRect/>
+          </a:stretch>
+        </p:blipFill>
+        <p:spPr>
+          <a:xfrm>
+            <a:off x="530087" y="2533217"/>
+            <a:ext cx="6891129" cy="3229426"/>
+          </a:xfrm>
+          <a:prstGeom prst="rect">
+            <a:avLst/>
+          </a:prstGeom>
+        </p:spPr>
+      </p:pic>
+    </p:spTree>
+    <p:extLst>
+      <p:ext uri="{BB962C8B-B14F-4D97-AF65-F5344CB8AC3E}">
+        <p14:creationId xmlns:p14="http://schemas.microsoft.com/office/powerpoint/2010/main" val="153661931"/>
+      </p:ext>
+    </p:extLst>
+  </p:cSld>
+  <p:clrMapOvr>
+    <a:masterClrMapping/>
+  </p:clrMapOvr>
+</p:sld>
+</file>
+
+<file path=ppt/slides/slide19.xml><?xml version="1.0" encoding="utf-8"?>
+<p:sld xmlns:a="http://schemas.openxmlformats.org/drawingml/2006/main" xmlns:r="http://schemas.openxmlformats.org/officeDocument/2006/relationships" xmlns:p="http://schemas.openxmlformats.org/presentationml/2006/main">
+  <p:cSld>
+    <p:spTree>
+      <p:nvGrpSpPr>
+        <p:cNvPr id="1" name=""/>
+        <p:cNvGrpSpPr/>
+        <p:nvPr/>
+      </p:nvGrpSpPr>
+      <p:grpSpPr>
+        <a:xfrm>
+          <a:off x="0" y="0"/>
+          <a:ext cx="0" cy="0"/>
+          <a:chOff x="0" y="0"/>
+          <a:chExt cx="0" cy="0"/>
+        </a:xfrm>
+      </p:grpSpPr>
+      <p:sp>
+        <p:nvSpPr>
+          <p:cNvPr id="2" name="Título 1">
+            <a:extLst>
+              <a:ext uri="{FF2B5EF4-FFF2-40B4-BE49-F238E27FC236}">
+                <a16:creationId xmlns:a16="http://schemas.microsoft.com/office/drawing/2014/main" id="{2F7C283C-9C7C-4177-BF9F-227DFC817C7D}"/>
+              </a:ext>
+            </a:extLst>
+          </p:cNvPr>
+          <p:cNvSpPr>
+            <a:spLocks noGrp="1"/>
+          </p:cNvSpPr>
+          <p:nvPr>
+            <p:ph type="title"/>
+          </p:nvPr>
+        </p:nvSpPr>
+        <p:spPr/>
+        <p:txBody>
+          <a:bodyPr/>
+          <a:lstStyle/>
+          <a:p>
+            <a:r>
+              <a:rPr lang="en-US" dirty="0" err="1"/>
+              <a:t>Desenvolvimento</a:t>
+            </a:r>
+            <a:r>
+              <a:rPr lang="en-US" dirty="0"/>
+              <a:t> de </a:t>
+            </a:r>
+            <a:r>
+              <a:rPr lang="en-US" dirty="0" err="1"/>
+              <a:t>aplicações</a:t>
+            </a:r>
+            <a:endParaRPr lang="pt-PT" dirty="0"/>
+          </a:p>
+        </p:txBody>
+      </p:sp>
+      <p:graphicFrame>
+        <p:nvGraphicFramePr>
+          <p:cNvPr id="4" name="Marcador de Posição de Conteúdo 5">
+            <a:extLst>
+              <a:ext uri="{FF2B5EF4-FFF2-40B4-BE49-F238E27FC236}">
+                <a16:creationId xmlns:a16="http://schemas.microsoft.com/office/drawing/2014/main" id="{1F8C91E4-6263-4C08-B982-D4BAD55362F9}"/>
+              </a:ext>
+            </a:extLst>
+          </p:cNvPr>
+          <p:cNvGraphicFramePr>
+            <a:graphicFrameLocks noGrp="1"/>
+          </p:cNvGraphicFramePr>
+          <p:nvPr>
+            <p:ph idx="1"/>
+            <p:extLst>
+              <p:ext uri="{D42A27DB-BD31-4B8C-83A1-F6EECF244321}">
+                <p14:modId xmlns:p14="http://schemas.microsoft.com/office/powerpoint/2010/main" val="3423702433"/>
+              </p:ext>
+            </p:extLst>
+          </p:nvPr>
+        </p:nvGraphicFramePr>
+        <p:xfrm>
+          <a:off x="7182678" y="2222500"/>
+          <a:ext cx="4190172" cy="3636963"/>
+        </p:xfrm>
+        <a:graphic>
+          <a:graphicData uri="http://schemas.openxmlformats.org/drawingml/2006/chart">
+            <c:chart xmlns:c="http://schemas.openxmlformats.org/drawingml/2006/chart" xmlns:r="http://schemas.openxmlformats.org/officeDocument/2006/relationships" r:id="rId2"/>
+          </a:graphicData>
+        </a:graphic>
+      </p:graphicFrame>
+      <p:pic>
+        <p:nvPicPr>
+          <p:cNvPr id="7" name="Imagem 6" descr="Uma imagem com captura de ecrã&#10;&#10;Descrição gerada automaticamente">
+            <a:extLst>
+              <a:ext uri="{FF2B5EF4-FFF2-40B4-BE49-F238E27FC236}">
+                <a16:creationId xmlns:a16="http://schemas.microsoft.com/office/drawing/2014/main" id="{1F0EADDF-F757-4AF8-8185-F50E4F8B7F74}"/>
+              </a:ext>
+            </a:extLst>
+          </p:cNvPr>
+          <p:cNvPicPr>
+            <a:picLocks noChangeAspect="1"/>
+          </p:cNvPicPr>
+          <p:nvPr/>
+        </p:nvPicPr>
+        <p:blipFill>
+          <a:blip r:embed="rId3"/>
+          <a:stretch>
+            <a:fillRect/>
+          </a:stretch>
+        </p:blipFill>
+        <p:spPr>
+          <a:xfrm>
+            <a:off x="359626" y="2027583"/>
+            <a:ext cx="6597766" cy="4383229"/>
+          </a:xfrm>
+          <a:prstGeom prst="rect">
+            <a:avLst/>
+          </a:prstGeom>
+        </p:spPr>
+      </p:pic>
+      <p:sp>
+        <p:nvSpPr>
+          <p:cNvPr id="8" name="CaixaDeTexto 7">
+            <a:extLst>
+              <a:ext uri="{FF2B5EF4-FFF2-40B4-BE49-F238E27FC236}">
+                <a16:creationId xmlns:a16="http://schemas.microsoft.com/office/drawing/2014/main" id="{B66B32DE-1006-43A7-A69D-C2F6DFEB56A2}"/>
+              </a:ext>
+            </a:extLst>
+          </p:cNvPr>
+          <p:cNvSpPr txBox="1"/>
+          <p:nvPr/>
+        </p:nvSpPr>
+        <p:spPr>
+          <a:xfrm>
+            <a:off x="4287078" y="1427030"/>
+            <a:ext cx="2504661" cy="369332"/>
+          </a:xfrm>
+          <a:prstGeom prst="rect">
+            <a:avLst/>
+          </a:prstGeom>
+          <a:noFill/>
+        </p:spPr>
+        <p:txBody>
+          <a:bodyPr wrap="square" rtlCol="0">
+            <a:spAutoFit/>
+          </a:bodyPr>
+          <a:lstStyle/>
+          <a:p>
+            <a:pPr algn="ctr"/>
+            <a:r>
+              <a:rPr lang="pt-PT" dirty="0"/>
+              <a:t>Sprint 2</a:t>
+            </a:r>
+          </a:p>
+        </p:txBody>
+      </p:sp>
+    </p:spTree>
+    <p:extLst>
+      <p:ext uri="{BB962C8B-B14F-4D97-AF65-F5344CB8AC3E}">
+        <p14:creationId xmlns:p14="http://schemas.microsoft.com/office/powerpoint/2010/main" val="537085873"/>
+      </p:ext>
+    </p:extLst>
+  </p:cSld>
+  <p:clrMapOvr>
+    <a:masterClrMapping/>
+  </p:clrMapOvr>
+</p:sld>
+</file>
+
 <file path=ppt/slides/slide2.xml><?xml version="1.0" encoding="utf-8"?>
 <p:sld xmlns:a="http://schemas.openxmlformats.org/drawingml/2006/main" xmlns:r="http://schemas.openxmlformats.org/officeDocument/2006/relationships" xmlns:p="http://schemas.openxmlformats.org/presentationml/2006/main">
   <p:cSld>

</xml_diff>